<commit_message>
RFP 시스템 구성도 v0.1.1 [2023-01-28 20:30]
</commit_message>
<xml_diff>
--- a/Documents/Requirements/service_order_client/raw/학과 커뮤니티 웹사이트 및 모바일 앱 개발 시스템 구성도.pptx
+++ b/Documents/Requirements/service_order_client/raw/학과 커뮤니티 웹사이트 및 모바일 앱 개발 시스템 구성도.pptx
@@ -6,7 +6,8 @@
   </p:sldMasterIdLst>
   <p:sldIdLst>
     <p:sldId id="256" r:id="rId2"/>
-    <p:sldId id="257" r:id="rId3"/>
+    <p:sldId id="258" r:id="rId3"/>
+    <p:sldId id="257" r:id="rId4"/>
   </p:sldIdLst>
   <p:sldSz cx="12192000" cy="6858000"/>
   <p:notesSz cx="6858000" cy="9144000"/>
@@ -105,7 +106,2731 @@
       </a:defRPr>
     </a:lvl9pPr>
   </p:defaultTextStyle>
+  <p:extLst>
+    <p:ext uri="{EFAFB233-063F-42B5-8137-9DF3F51BA10A}">
+      <p15:sldGuideLst xmlns:p15="http://schemas.microsoft.com/office/powerpoint/2012/main"/>
+    </p:ext>
+  </p:extLst>
 </p:presentation>
+</file>
+
+<file path=ppt/diagrams/colors1.xml><?xml version="1.0" encoding="utf-8"?>
+<dgm:colorsDef xmlns:dgm="http://schemas.openxmlformats.org/drawingml/2006/diagram" xmlns:a="http://schemas.openxmlformats.org/drawingml/2006/main" uniqueId="urn:microsoft.com/office/officeart/2005/8/colors/colorful4">
+  <dgm:title val=""/>
+  <dgm:desc val=""/>
+  <dgm:catLst>
+    <dgm:cat type="colorful" pri="10400"/>
+  </dgm:catLst>
+  <dgm:styleLbl name="node0">
+    <dgm:fillClrLst meth="repeat">
+      <a:schemeClr val="accent3"/>
+    </dgm:fillClrLst>
+    <dgm:linClrLst meth="repeat">
+      <a:schemeClr val="lt1"/>
+    </dgm:linClrLst>
+    <dgm:effectClrLst/>
+    <dgm:txLinClrLst/>
+    <dgm:txFillClrLst/>
+    <dgm:txEffectClrLst/>
+  </dgm:styleLbl>
+  <dgm:styleLbl name="node1">
+    <dgm:fillClrLst>
+      <a:schemeClr val="accent4"/>
+      <a:schemeClr val="accent5"/>
+    </dgm:fillClrLst>
+    <dgm:linClrLst meth="repeat">
+      <a:schemeClr val="lt1"/>
+    </dgm:linClrLst>
+    <dgm:effectClrLst/>
+    <dgm:txLinClrLst/>
+    <dgm:txFillClrLst/>
+    <dgm:txEffectClrLst/>
+  </dgm:styleLbl>
+  <dgm:styleLbl name="alignNode1">
+    <dgm:fillClrLst>
+      <a:schemeClr val="accent4"/>
+      <a:schemeClr val="accent5"/>
+    </dgm:fillClrLst>
+    <dgm:linClrLst>
+      <a:schemeClr val="accent4"/>
+      <a:schemeClr val="accent5"/>
+    </dgm:linClrLst>
+    <dgm:effectClrLst/>
+    <dgm:txLinClrLst/>
+    <dgm:txFillClrLst/>
+    <dgm:txEffectClrLst/>
+  </dgm:styleLbl>
+  <dgm:styleLbl name="lnNode1">
+    <dgm:fillClrLst>
+      <a:schemeClr val="accent4"/>
+      <a:schemeClr val="accent5"/>
+    </dgm:fillClrLst>
+    <dgm:linClrLst meth="repeat">
+      <a:schemeClr val="lt1"/>
+    </dgm:linClrLst>
+    <dgm:effectClrLst/>
+    <dgm:txLinClrLst/>
+    <dgm:txFillClrLst/>
+    <dgm:txEffectClrLst/>
+  </dgm:styleLbl>
+  <dgm:styleLbl name="vennNode1">
+    <dgm:fillClrLst>
+      <a:schemeClr val="accent4">
+        <a:alpha val="50000"/>
+      </a:schemeClr>
+      <a:schemeClr val="accent5">
+        <a:alpha val="50000"/>
+      </a:schemeClr>
+    </dgm:fillClrLst>
+    <dgm:linClrLst meth="repeat">
+      <a:schemeClr val="lt1"/>
+    </dgm:linClrLst>
+    <dgm:effectClrLst/>
+    <dgm:txLinClrLst/>
+    <dgm:txFillClrLst/>
+    <dgm:txEffectClrLst/>
+  </dgm:styleLbl>
+  <dgm:styleLbl name="node2">
+    <dgm:fillClrLst>
+      <a:schemeClr val="accent5"/>
+    </dgm:fillClrLst>
+    <dgm:linClrLst meth="repeat">
+      <a:schemeClr val="lt1"/>
+    </dgm:linClrLst>
+    <dgm:effectClrLst/>
+    <dgm:txLinClrLst/>
+    <dgm:txFillClrLst/>
+    <dgm:txEffectClrLst/>
+  </dgm:styleLbl>
+  <dgm:styleLbl name="node3">
+    <dgm:fillClrLst>
+      <a:schemeClr val="accent6"/>
+    </dgm:fillClrLst>
+    <dgm:linClrLst meth="repeat">
+      <a:schemeClr val="lt1"/>
+    </dgm:linClrLst>
+    <dgm:effectClrLst/>
+    <dgm:txLinClrLst/>
+    <dgm:txFillClrLst/>
+    <dgm:txEffectClrLst/>
+  </dgm:styleLbl>
+  <dgm:styleLbl name="node4">
+    <dgm:fillClrLst>
+      <a:schemeClr val="accent1"/>
+    </dgm:fillClrLst>
+    <dgm:linClrLst meth="repeat">
+      <a:schemeClr val="lt1"/>
+    </dgm:linClrLst>
+    <dgm:effectClrLst/>
+    <dgm:txLinClrLst/>
+    <dgm:txFillClrLst/>
+    <dgm:txEffectClrLst/>
+  </dgm:styleLbl>
+  <dgm:styleLbl name="fgImgPlace1">
+    <dgm:fillClrLst>
+      <a:schemeClr val="accent4">
+        <a:tint val="50000"/>
+      </a:schemeClr>
+      <a:schemeClr val="accent5">
+        <a:tint val="50000"/>
+      </a:schemeClr>
+    </dgm:fillClrLst>
+    <dgm:linClrLst meth="repeat">
+      <a:schemeClr val="lt1"/>
+    </dgm:linClrLst>
+    <dgm:effectClrLst/>
+    <dgm:txLinClrLst/>
+    <dgm:txFillClrLst meth="repeat">
+      <a:schemeClr val="lt1"/>
+    </dgm:txFillClrLst>
+    <dgm:txEffectClrLst/>
+  </dgm:styleLbl>
+  <dgm:styleLbl name="alignImgPlace1">
+    <dgm:fillClrLst>
+      <a:schemeClr val="accent4">
+        <a:tint val="50000"/>
+      </a:schemeClr>
+      <a:schemeClr val="accent5">
+        <a:tint val="20000"/>
+      </a:schemeClr>
+    </dgm:fillClrLst>
+    <dgm:linClrLst meth="repeat">
+      <a:schemeClr val="lt1"/>
+    </dgm:linClrLst>
+    <dgm:effectClrLst/>
+    <dgm:txLinClrLst/>
+    <dgm:txFillClrLst meth="repeat">
+      <a:schemeClr val="lt1"/>
+    </dgm:txFillClrLst>
+    <dgm:txEffectClrLst/>
+  </dgm:styleLbl>
+  <dgm:styleLbl name="bgImgPlace1">
+    <dgm:fillClrLst>
+      <a:schemeClr val="accent4">
+        <a:tint val="50000"/>
+      </a:schemeClr>
+      <a:schemeClr val="accent5">
+        <a:tint val="20000"/>
+      </a:schemeClr>
+    </dgm:fillClrLst>
+    <dgm:linClrLst meth="repeat">
+      <a:schemeClr val="lt1"/>
+    </dgm:linClrLst>
+    <dgm:effectClrLst/>
+    <dgm:txLinClrLst/>
+    <dgm:txFillClrLst meth="repeat">
+      <a:schemeClr val="lt1"/>
+    </dgm:txFillClrLst>
+    <dgm:txEffectClrLst/>
+  </dgm:styleLbl>
+  <dgm:styleLbl name="sibTrans2D1">
+    <dgm:fillClrLst>
+      <a:schemeClr val="accent4"/>
+      <a:schemeClr val="accent5"/>
+    </dgm:fillClrLst>
+    <dgm:linClrLst meth="repeat">
+      <a:schemeClr val="lt1"/>
+    </dgm:linClrLst>
+    <dgm:effectClrLst/>
+    <dgm:txLinClrLst/>
+    <dgm:txFillClrLst/>
+    <dgm:txEffectClrLst/>
+  </dgm:styleLbl>
+  <dgm:styleLbl name="fgSibTrans2D1">
+    <dgm:fillClrLst>
+      <a:schemeClr val="accent4"/>
+      <a:schemeClr val="accent5"/>
+    </dgm:fillClrLst>
+    <dgm:linClrLst meth="repeat">
+      <a:schemeClr val="lt1"/>
+    </dgm:linClrLst>
+    <dgm:effectClrLst/>
+    <dgm:txLinClrLst/>
+    <dgm:txFillClrLst meth="repeat">
+      <a:schemeClr val="lt1"/>
+    </dgm:txFillClrLst>
+    <dgm:txEffectClrLst/>
+  </dgm:styleLbl>
+  <dgm:styleLbl name="bgSibTrans2D1">
+    <dgm:fillClrLst>
+      <a:schemeClr val="accent4"/>
+      <a:schemeClr val="accent5"/>
+    </dgm:fillClrLst>
+    <dgm:linClrLst meth="repeat">
+      <a:schemeClr val="lt1"/>
+    </dgm:linClrLst>
+    <dgm:effectClrLst/>
+    <dgm:txLinClrLst/>
+    <dgm:txFillClrLst meth="repeat">
+      <a:schemeClr val="lt1"/>
+    </dgm:txFillClrLst>
+    <dgm:txEffectClrLst/>
+  </dgm:styleLbl>
+  <dgm:styleLbl name="sibTrans1D1">
+    <dgm:fillClrLst/>
+    <dgm:linClrLst>
+      <a:schemeClr val="accent4"/>
+      <a:schemeClr val="accent5"/>
+    </dgm:linClrLst>
+    <dgm:effectClrLst/>
+    <dgm:txLinClrLst/>
+    <dgm:txFillClrLst meth="repeat">
+      <a:schemeClr val="tx1"/>
+    </dgm:txFillClrLst>
+    <dgm:txEffectClrLst/>
+  </dgm:styleLbl>
+  <dgm:styleLbl name="callout">
+    <dgm:fillClrLst meth="repeat">
+      <a:schemeClr val="accent4"/>
+    </dgm:fillClrLst>
+    <dgm:linClrLst meth="repeat">
+      <a:schemeClr val="accent4">
+        <a:tint val="50000"/>
+      </a:schemeClr>
+    </dgm:linClrLst>
+    <dgm:effectClrLst/>
+    <dgm:txLinClrLst/>
+    <dgm:txFillClrLst meth="repeat">
+      <a:schemeClr val="tx1"/>
+    </dgm:txFillClrLst>
+    <dgm:txEffectClrLst/>
+  </dgm:styleLbl>
+  <dgm:styleLbl name="asst0">
+    <dgm:fillClrLst meth="repeat">
+      <a:schemeClr val="accent4"/>
+    </dgm:fillClrLst>
+    <dgm:linClrLst meth="repeat">
+      <a:schemeClr val="lt1">
+        <a:shade val="80000"/>
+      </a:schemeClr>
+    </dgm:linClrLst>
+    <dgm:effectClrLst/>
+    <dgm:txLinClrLst/>
+    <dgm:txFillClrLst/>
+    <dgm:txEffectClrLst/>
+  </dgm:styleLbl>
+  <dgm:styleLbl name="asst1">
+    <dgm:fillClrLst meth="repeat">
+      <a:schemeClr val="accent5"/>
+    </dgm:fillClrLst>
+    <dgm:linClrLst meth="repeat">
+      <a:schemeClr val="lt1">
+        <a:shade val="80000"/>
+      </a:schemeClr>
+    </dgm:linClrLst>
+    <dgm:effectClrLst/>
+    <dgm:txLinClrLst/>
+    <dgm:txFillClrLst/>
+    <dgm:txEffectClrLst/>
+  </dgm:styleLbl>
+  <dgm:styleLbl name="asst2">
+    <dgm:fillClrLst>
+      <a:schemeClr val="accent6"/>
+    </dgm:fillClrLst>
+    <dgm:linClrLst meth="repeat">
+      <a:schemeClr val="lt1"/>
+    </dgm:linClrLst>
+    <dgm:effectClrLst/>
+    <dgm:txLinClrLst/>
+    <dgm:txFillClrLst/>
+    <dgm:txEffectClrLst/>
+  </dgm:styleLbl>
+  <dgm:styleLbl name="asst3">
+    <dgm:fillClrLst>
+      <a:schemeClr val="accent1"/>
+    </dgm:fillClrLst>
+    <dgm:linClrLst meth="repeat">
+      <a:schemeClr val="lt1"/>
+    </dgm:linClrLst>
+    <dgm:effectClrLst/>
+    <dgm:txLinClrLst/>
+    <dgm:txFillClrLst/>
+    <dgm:txEffectClrLst/>
+  </dgm:styleLbl>
+  <dgm:styleLbl name="asst4">
+    <dgm:fillClrLst>
+      <a:schemeClr val="accent2"/>
+    </dgm:fillClrLst>
+    <dgm:linClrLst meth="repeat">
+      <a:schemeClr val="lt1"/>
+    </dgm:linClrLst>
+    <dgm:effectClrLst/>
+    <dgm:txLinClrLst/>
+    <dgm:txFillClrLst/>
+    <dgm:txEffectClrLst/>
+  </dgm:styleLbl>
+  <dgm:styleLbl name="parChTrans2D1">
+    <dgm:fillClrLst meth="repeat">
+      <a:schemeClr val="accent4"/>
+    </dgm:fillClrLst>
+    <dgm:linClrLst meth="repeat">
+      <a:schemeClr val="lt1"/>
+    </dgm:linClrLst>
+    <dgm:effectClrLst/>
+    <dgm:txLinClrLst/>
+    <dgm:txFillClrLst meth="repeat">
+      <a:schemeClr val="lt1"/>
+    </dgm:txFillClrLst>
+    <dgm:txEffectClrLst/>
+  </dgm:styleLbl>
+  <dgm:styleLbl name="parChTrans2D2">
+    <dgm:fillClrLst meth="repeat">
+      <a:schemeClr val="accent5"/>
+    </dgm:fillClrLst>
+    <dgm:linClrLst meth="repeat">
+      <a:schemeClr val="lt1"/>
+    </dgm:linClrLst>
+    <dgm:effectClrLst/>
+    <dgm:txLinClrLst/>
+    <dgm:txFillClrLst/>
+    <dgm:txEffectClrLst/>
+  </dgm:styleLbl>
+  <dgm:styleLbl name="parChTrans2D3">
+    <dgm:fillClrLst meth="repeat">
+      <a:schemeClr val="accent5"/>
+    </dgm:fillClrLst>
+    <dgm:linClrLst meth="repeat">
+      <a:schemeClr val="lt1"/>
+    </dgm:linClrLst>
+    <dgm:effectClrLst/>
+    <dgm:txLinClrLst/>
+    <dgm:txFillClrLst/>
+    <dgm:txEffectClrLst/>
+  </dgm:styleLbl>
+  <dgm:styleLbl name="parChTrans2D4">
+    <dgm:fillClrLst meth="repeat">
+      <a:schemeClr val="accent6"/>
+    </dgm:fillClrLst>
+    <dgm:linClrLst meth="repeat">
+      <a:schemeClr val="lt1"/>
+    </dgm:linClrLst>
+    <dgm:effectClrLst/>
+    <dgm:txLinClrLst/>
+    <dgm:txFillClrLst meth="repeat">
+      <a:schemeClr val="lt1"/>
+    </dgm:txFillClrLst>
+    <dgm:txEffectClrLst/>
+  </dgm:styleLbl>
+  <dgm:styleLbl name="parChTrans1D1">
+    <dgm:fillClrLst meth="repeat">
+      <a:schemeClr val="accent4"/>
+    </dgm:fillClrLst>
+    <dgm:linClrLst meth="repeat">
+      <a:schemeClr val="accent4"/>
+    </dgm:linClrLst>
+    <dgm:effectClrLst/>
+    <dgm:txLinClrLst/>
+    <dgm:txFillClrLst meth="repeat">
+      <a:schemeClr val="tx1"/>
+    </dgm:txFillClrLst>
+    <dgm:txEffectClrLst/>
+  </dgm:styleLbl>
+  <dgm:styleLbl name="parChTrans1D2">
+    <dgm:fillClrLst meth="repeat">
+      <a:schemeClr val="accent4">
+        <a:tint val="90000"/>
+      </a:schemeClr>
+    </dgm:fillClrLst>
+    <dgm:linClrLst meth="repeat">
+      <a:schemeClr val="accent5"/>
+    </dgm:linClrLst>
+    <dgm:effectClrLst/>
+    <dgm:txLinClrLst/>
+    <dgm:txFillClrLst meth="repeat">
+      <a:schemeClr val="tx1"/>
+    </dgm:txFillClrLst>
+    <dgm:txEffectClrLst/>
+  </dgm:styleLbl>
+  <dgm:styleLbl name="parChTrans1D3">
+    <dgm:fillClrLst meth="repeat">
+      <a:schemeClr val="accent4">
+        <a:tint val="70000"/>
+      </a:schemeClr>
+    </dgm:fillClrLst>
+    <dgm:linClrLst meth="repeat">
+      <a:schemeClr val="accent6"/>
+    </dgm:linClrLst>
+    <dgm:effectClrLst/>
+    <dgm:txLinClrLst/>
+    <dgm:txFillClrLst meth="repeat">
+      <a:schemeClr val="tx1"/>
+    </dgm:txFillClrLst>
+    <dgm:txEffectClrLst/>
+  </dgm:styleLbl>
+  <dgm:styleLbl name="parChTrans1D4">
+    <dgm:fillClrLst meth="repeat">
+      <a:schemeClr val="accent4">
+        <a:tint val="50000"/>
+      </a:schemeClr>
+    </dgm:fillClrLst>
+    <dgm:linClrLst meth="repeat">
+      <a:schemeClr val="accent1"/>
+    </dgm:linClrLst>
+    <dgm:effectClrLst/>
+    <dgm:txLinClrLst/>
+    <dgm:txFillClrLst meth="repeat">
+      <a:schemeClr val="tx1"/>
+    </dgm:txFillClrLst>
+    <dgm:txEffectClrLst/>
+  </dgm:styleLbl>
+  <dgm:styleLbl name="fgAcc1">
+    <dgm:fillClrLst meth="repeat">
+      <a:schemeClr val="lt1">
+        <a:alpha val="90000"/>
+      </a:schemeClr>
+    </dgm:fillClrLst>
+    <dgm:linClrLst>
+      <a:schemeClr val="accent4"/>
+      <a:schemeClr val="accent5"/>
+    </dgm:linClrLst>
+    <dgm:effectClrLst/>
+    <dgm:txLinClrLst/>
+    <dgm:txFillClrLst meth="repeat">
+      <a:schemeClr val="dk1"/>
+    </dgm:txFillClrLst>
+    <dgm:txEffectClrLst/>
+  </dgm:styleLbl>
+  <dgm:styleLbl name="conFgAcc1">
+    <dgm:fillClrLst meth="repeat">
+      <a:schemeClr val="lt1">
+        <a:alpha val="90000"/>
+      </a:schemeClr>
+    </dgm:fillClrLst>
+    <dgm:linClrLst>
+      <a:schemeClr val="accent4"/>
+      <a:schemeClr val="accent5"/>
+    </dgm:linClrLst>
+    <dgm:effectClrLst/>
+    <dgm:txLinClrLst/>
+    <dgm:txFillClrLst meth="repeat">
+      <a:schemeClr val="dk1"/>
+    </dgm:txFillClrLst>
+    <dgm:txEffectClrLst/>
+  </dgm:styleLbl>
+  <dgm:styleLbl name="alignAcc1">
+    <dgm:fillClrLst meth="repeat">
+      <a:schemeClr val="lt1">
+        <a:alpha val="90000"/>
+      </a:schemeClr>
+    </dgm:fillClrLst>
+    <dgm:linClrLst>
+      <a:schemeClr val="accent4"/>
+      <a:schemeClr val="accent5"/>
+    </dgm:linClrLst>
+    <dgm:effectClrLst/>
+    <dgm:txLinClrLst/>
+    <dgm:txFillClrLst meth="repeat">
+      <a:schemeClr val="dk1"/>
+    </dgm:txFillClrLst>
+    <dgm:txEffectClrLst/>
+  </dgm:styleLbl>
+  <dgm:styleLbl name="trAlignAcc1">
+    <dgm:fillClrLst meth="repeat">
+      <a:schemeClr val="lt1">
+        <a:alpha val="40000"/>
+      </a:schemeClr>
+    </dgm:fillClrLst>
+    <dgm:linClrLst meth="repeat">
+      <a:schemeClr val="accent4"/>
+    </dgm:linClrLst>
+    <dgm:effectClrLst/>
+    <dgm:txLinClrLst/>
+    <dgm:txFillClrLst meth="repeat">
+      <a:schemeClr val="dk1"/>
+    </dgm:txFillClrLst>
+    <dgm:txEffectClrLst/>
+  </dgm:styleLbl>
+  <dgm:styleLbl name="bgAcc1">
+    <dgm:fillClrLst meth="repeat">
+      <a:schemeClr val="lt1">
+        <a:alpha val="90000"/>
+      </a:schemeClr>
+    </dgm:fillClrLst>
+    <dgm:linClrLst>
+      <a:schemeClr val="accent4"/>
+      <a:schemeClr val="accent5"/>
+    </dgm:linClrLst>
+    <dgm:effectClrLst/>
+    <dgm:txLinClrLst/>
+    <dgm:txFillClrLst meth="repeat">
+      <a:schemeClr val="dk1"/>
+    </dgm:txFillClrLst>
+    <dgm:txEffectClrLst/>
+  </dgm:styleLbl>
+  <dgm:styleLbl name="solidFgAcc1">
+    <dgm:fillClrLst meth="repeat">
+      <a:schemeClr val="lt1"/>
+    </dgm:fillClrLst>
+    <dgm:linClrLst>
+      <a:schemeClr val="accent4"/>
+      <a:schemeClr val="accent5"/>
+    </dgm:linClrLst>
+    <dgm:effectClrLst/>
+    <dgm:txLinClrLst/>
+    <dgm:txFillClrLst meth="repeat">
+      <a:schemeClr val="dk1"/>
+    </dgm:txFillClrLst>
+    <dgm:txEffectClrLst/>
+  </dgm:styleLbl>
+  <dgm:styleLbl name="solidAlignAcc1">
+    <dgm:fillClrLst meth="repeat">
+      <a:schemeClr val="lt1"/>
+    </dgm:fillClrLst>
+    <dgm:linClrLst>
+      <a:schemeClr val="accent4"/>
+      <a:schemeClr val="accent5"/>
+    </dgm:linClrLst>
+    <dgm:effectClrLst/>
+    <dgm:txLinClrLst/>
+    <dgm:txFillClrLst meth="repeat">
+      <a:schemeClr val="dk1"/>
+    </dgm:txFillClrLst>
+    <dgm:txEffectClrLst/>
+  </dgm:styleLbl>
+  <dgm:styleLbl name="solidBgAcc1">
+    <dgm:fillClrLst meth="repeat">
+      <a:schemeClr val="lt1"/>
+    </dgm:fillClrLst>
+    <dgm:linClrLst>
+      <a:schemeClr val="accent4"/>
+      <a:schemeClr val="accent5"/>
+    </dgm:linClrLst>
+    <dgm:effectClrLst/>
+    <dgm:txLinClrLst/>
+    <dgm:txFillClrLst meth="repeat">
+      <a:schemeClr val="dk1"/>
+    </dgm:txFillClrLst>
+    <dgm:txEffectClrLst/>
+  </dgm:styleLbl>
+  <dgm:styleLbl name="fgAccFollowNode1">
+    <dgm:fillClrLst>
+      <a:schemeClr val="accent4">
+        <a:tint val="40000"/>
+        <a:alpha val="90000"/>
+      </a:schemeClr>
+      <a:schemeClr val="accent5">
+        <a:tint val="40000"/>
+        <a:alpha val="90000"/>
+      </a:schemeClr>
+    </dgm:fillClrLst>
+    <dgm:linClrLst>
+      <a:schemeClr val="accent4">
+        <a:tint val="40000"/>
+        <a:alpha val="90000"/>
+      </a:schemeClr>
+      <a:schemeClr val="accent5">
+        <a:tint val="40000"/>
+        <a:alpha val="90000"/>
+      </a:schemeClr>
+    </dgm:linClrLst>
+    <dgm:effectClrLst/>
+    <dgm:txLinClrLst/>
+    <dgm:txFillClrLst meth="repeat">
+      <a:schemeClr val="dk1"/>
+    </dgm:txFillClrLst>
+    <dgm:txEffectClrLst/>
+  </dgm:styleLbl>
+  <dgm:styleLbl name="alignAccFollowNode1">
+    <dgm:fillClrLst>
+      <a:schemeClr val="accent4">
+        <a:tint val="40000"/>
+        <a:alpha val="90000"/>
+      </a:schemeClr>
+      <a:schemeClr val="accent5">
+        <a:tint val="40000"/>
+        <a:alpha val="90000"/>
+      </a:schemeClr>
+    </dgm:fillClrLst>
+    <dgm:linClrLst>
+      <a:schemeClr val="accent4">
+        <a:tint val="40000"/>
+        <a:alpha val="90000"/>
+      </a:schemeClr>
+      <a:schemeClr val="accent5">
+        <a:tint val="40000"/>
+        <a:alpha val="90000"/>
+      </a:schemeClr>
+    </dgm:linClrLst>
+    <dgm:effectClrLst/>
+    <dgm:txLinClrLst/>
+    <dgm:txFillClrLst meth="repeat">
+      <a:schemeClr val="dk1"/>
+    </dgm:txFillClrLst>
+    <dgm:txEffectClrLst/>
+  </dgm:styleLbl>
+  <dgm:styleLbl name="bgAccFollowNode1">
+    <dgm:fillClrLst>
+      <a:schemeClr val="accent4">
+        <a:tint val="40000"/>
+        <a:alpha val="90000"/>
+      </a:schemeClr>
+      <a:schemeClr val="accent5">
+        <a:tint val="40000"/>
+        <a:alpha val="90000"/>
+      </a:schemeClr>
+    </dgm:fillClrLst>
+    <dgm:linClrLst>
+      <a:schemeClr val="accent4">
+        <a:tint val="40000"/>
+        <a:alpha val="90000"/>
+      </a:schemeClr>
+      <a:schemeClr val="accent5">
+        <a:tint val="40000"/>
+        <a:alpha val="90000"/>
+      </a:schemeClr>
+    </dgm:linClrLst>
+    <dgm:effectClrLst/>
+    <dgm:txLinClrLst/>
+    <dgm:txFillClrLst meth="repeat">
+      <a:schemeClr val="dk1"/>
+    </dgm:txFillClrLst>
+    <dgm:txEffectClrLst/>
+  </dgm:styleLbl>
+  <dgm:styleLbl name="fgAcc0">
+    <dgm:fillClrLst meth="repeat">
+      <a:schemeClr val="lt1">
+        <a:alpha val="90000"/>
+      </a:schemeClr>
+    </dgm:fillClrLst>
+    <dgm:linClrLst>
+      <a:schemeClr val="accent3"/>
+    </dgm:linClrLst>
+    <dgm:effectClrLst/>
+    <dgm:txLinClrLst/>
+    <dgm:txFillClrLst meth="repeat">
+      <a:schemeClr val="dk1"/>
+    </dgm:txFillClrLst>
+    <dgm:txEffectClrLst/>
+  </dgm:styleLbl>
+  <dgm:styleLbl name="fgAcc2">
+    <dgm:fillClrLst meth="repeat">
+      <a:schemeClr val="lt1">
+        <a:alpha val="90000"/>
+      </a:schemeClr>
+    </dgm:fillClrLst>
+    <dgm:linClrLst>
+      <a:schemeClr val="accent5"/>
+    </dgm:linClrLst>
+    <dgm:effectClrLst/>
+    <dgm:txLinClrLst/>
+    <dgm:txFillClrLst meth="repeat">
+      <a:schemeClr val="dk1"/>
+    </dgm:txFillClrLst>
+    <dgm:txEffectClrLst/>
+  </dgm:styleLbl>
+  <dgm:styleLbl name="fgAcc3">
+    <dgm:fillClrLst meth="repeat">
+      <a:schemeClr val="lt1">
+        <a:alpha val="90000"/>
+      </a:schemeClr>
+    </dgm:fillClrLst>
+    <dgm:linClrLst>
+      <a:schemeClr val="accent6"/>
+    </dgm:linClrLst>
+    <dgm:effectClrLst/>
+    <dgm:txLinClrLst/>
+    <dgm:txFillClrLst meth="repeat">
+      <a:schemeClr val="dk1"/>
+    </dgm:txFillClrLst>
+    <dgm:txEffectClrLst/>
+  </dgm:styleLbl>
+  <dgm:styleLbl name="fgAcc4">
+    <dgm:fillClrLst meth="repeat">
+      <a:schemeClr val="lt1">
+        <a:alpha val="90000"/>
+      </a:schemeClr>
+    </dgm:fillClrLst>
+    <dgm:linClrLst>
+      <a:schemeClr val="accent1"/>
+    </dgm:linClrLst>
+    <dgm:effectClrLst/>
+    <dgm:txLinClrLst/>
+    <dgm:txFillClrLst meth="repeat">
+      <a:schemeClr val="dk1"/>
+    </dgm:txFillClrLst>
+    <dgm:txEffectClrLst/>
+  </dgm:styleLbl>
+  <dgm:styleLbl name="bgShp">
+    <dgm:fillClrLst meth="repeat">
+      <a:schemeClr val="accent4">
+        <a:tint val="40000"/>
+      </a:schemeClr>
+    </dgm:fillClrLst>
+    <dgm:linClrLst meth="repeat">
+      <a:schemeClr val="dk1"/>
+    </dgm:linClrLst>
+    <dgm:effectClrLst/>
+    <dgm:txLinClrLst/>
+    <dgm:txFillClrLst meth="repeat">
+      <a:schemeClr val="dk1"/>
+    </dgm:txFillClrLst>
+    <dgm:txEffectClrLst/>
+  </dgm:styleLbl>
+  <dgm:styleLbl name="dkBgShp">
+    <dgm:fillClrLst meth="repeat">
+      <a:schemeClr val="accent4">
+        <a:shade val="90000"/>
+      </a:schemeClr>
+    </dgm:fillClrLst>
+    <dgm:linClrLst meth="repeat">
+      <a:schemeClr val="dk1"/>
+    </dgm:linClrLst>
+    <dgm:effectClrLst/>
+    <dgm:txLinClrLst/>
+    <dgm:txFillClrLst meth="repeat">
+      <a:schemeClr val="lt1"/>
+    </dgm:txFillClrLst>
+    <dgm:txEffectClrLst/>
+  </dgm:styleLbl>
+  <dgm:styleLbl name="trBgShp">
+    <dgm:fillClrLst meth="repeat">
+      <a:schemeClr val="accent4">
+        <a:tint val="50000"/>
+        <a:alpha val="40000"/>
+      </a:schemeClr>
+    </dgm:fillClrLst>
+    <dgm:linClrLst meth="repeat">
+      <a:schemeClr val="accent4"/>
+    </dgm:linClrLst>
+    <dgm:effectClrLst/>
+    <dgm:txLinClrLst/>
+    <dgm:txFillClrLst meth="repeat">
+      <a:schemeClr val="lt1"/>
+    </dgm:txFillClrLst>
+    <dgm:txEffectClrLst/>
+  </dgm:styleLbl>
+  <dgm:styleLbl name="fgShp">
+    <dgm:fillClrLst meth="repeat">
+      <a:schemeClr val="accent4">
+        <a:tint val="40000"/>
+      </a:schemeClr>
+    </dgm:fillClrLst>
+    <dgm:linClrLst meth="repeat">
+      <a:schemeClr val="lt1"/>
+    </dgm:linClrLst>
+    <dgm:effectClrLst/>
+    <dgm:txLinClrLst/>
+    <dgm:txFillClrLst meth="repeat">
+      <a:schemeClr val="dk1"/>
+    </dgm:txFillClrLst>
+    <dgm:txEffectClrLst/>
+  </dgm:styleLbl>
+  <dgm:styleLbl name="revTx">
+    <dgm:fillClrLst meth="repeat">
+      <a:schemeClr val="lt1">
+        <a:alpha val="0"/>
+      </a:schemeClr>
+    </dgm:fillClrLst>
+    <dgm:linClrLst meth="repeat">
+      <a:schemeClr val="dk1">
+        <a:alpha val="0"/>
+      </a:schemeClr>
+    </dgm:linClrLst>
+    <dgm:effectClrLst/>
+    <dgm:txLinClrLst/>
+    <dgm:txFillClrLst meth="repeat">
+      <a:schemeClr val="tx1"/>
+    </dgm:txFillClrLst>
+    <dgm:txEffectClrLst/>
+  </dgm:styleLbl>
+</dgm:colorsDef>
+</file>
+
+<file path=ppt/diagrams/data1.xml><?xml version="1.0" encoding="utf-8"?>
+<dgm:dataModel xmlns:dgm="http://schemas.openxmlformats.org/drawingml/2006/diagram" xmlns:a="http://schemas.openxmlformats.org/drawingml/2006/main">
+  <dgm:ptLst>
+    <dgm:pt modelId="{EE1C41A2-44F6-4BB7-9738-5E24B809B6BA}" type="doc">
+      <dgm:prSet loTypeId="urn:microsoft.com/office/officeart/2005/8/layout/chevron1" loCatId="process" qsTypeId="urn:microsoft.com/office/officeart/2005/8/quickstyle/simple1" qsCatId="simple" csTypeId="urn:microsoft.com/office/officeart/2005/8/colors/colorful4" csCatId="colorful" phldr="1"/>
+      <dgm:spPr/>
+    </dgm:pt>
+    <dgm:pt modelId="{58997698-761B-48BA-B4C8-3C4D8AC83ABD}">
+      <dgm:prSet phldrT="[텍스트]"/>
+      <dgm:spPr/>
+      <dgm:t>
+        <a:bodyPr/>
+        <a:lstStyle/>
+        <a:p>
+          <a:pPr latinLnBrk="1"/>
+          <a:r>
+            <a:rPr lang="ko-KR" altLang="en-US" dirty="0">
+              <a:solidFill>
+                <a:schemeClr val="tx1"/>
+              </a:solidFill>
+            </a:rPr>
+            <a:t>커뮤니티 웹사이트</a:t>
+          </a:r>
+        </a:p>
+      </dgm:t>
+    </dgm:pt>
+    <dgm:pt modelId="{0F77007B-88A7-4F2E-AB8A-B53A63CBC3D1}" type="parTrans" cxnId="{EDF47CC4-8CF9-4A88-B25E-BCA80D94DD0D}">
+      <dgm:prSet/>
+      <dgm:spPr/>
+      <dgm:t>
+        <a:bodyPr/>
+        <a:lstStyle/>
+        <a:p>
+          <a:pPr latinLnBrk="1"/>
+          <a:endParaRPr lang="ko-KR" altLang="en-US"/>
+        </a:p>
+      </dgm:t>
+    </dgm:pt>
+    <dgm:pt modelId="{7A9B17A6-0C2D-42A6-8950-62F6008F060E}" type="sibTrans" cxnId="{EDF47CC4-8CF9-4A88-B25E-BCA80D94DD0D}">
+      <dgm:prSet/>
+      <dgm:spPr/>
+      <dgm:t>
+        <a:bodyPr/>
+        <a:lstStyle/>
+        <a:p>
+          <a:pPr latinLnBrk="1"/>
+          <a:endParaRPr lang="ko-KR" altLang="en-US"/>
+        </a:p>
+      </dgm:t>
+    </dgm:pt>
+    <dgm:pt modelId="{5C42E6EB-799F-4241-A8CB-181EE3F20BE6}">
+      <dgm:prSet phldrT="[텍스트]"/>
+      <dgm:spPr/>
+      <dgm:t>
+        <a:bodyPr/>
+        <a:lstStyle/>
+        <a:p>
+          <a:pPr latinLnBrk="1"/>
+          <a:r>
+            <a:rPr lang="en-US" altLang="ko-KR" dirty="0">
+              <a:solidFill>
+                <a:schemeClr val="tx1"/>
+              </a:solidFill>
+            </a:rPr>
+            <a:t>IDE</a:t>
+          </a:r>
+          <a:endParaRPr lang="ko-KR" altLang="en-US" dirty="0">
+            <a:solidFill>
+              <a:schemeClr val="tx1"/>
+            </a:solidFill>
+          </a:endParaRPr>
+        </a:p>
+      </dgm:t>
+    </dgm:pt>
+    <dgm:pt modelId="{8EF0F9E8-7A45-4AE9-9C99-EDAFF551C533}" type="parTrans" cxnId="{09EB33CC-DA22-4638-B998-3943221EDFAC}">
+      <dgm:prSet/>
+      <dgm:spPr/>
+      <dgm:t>
+        <a:bodyPr/>
+        <a:lstStyle/>
+        <a:p>
+          <a:pPr latinLnBrk="1"/>
+          <a:endParaRPr lang="ko-KR" altLang="en-US"/>
+        </a:p>
+      </dgm:t>
+    </dgm:pt>
+    <dgm:pt modelId="{1C983B6D-6A36-4E6A-AE2B-552E554EBBE7}" type="sibTrans" cxnId="{09EB33CC-DA22-4638-B998-3943221EDFAC}">
+      <dgm:prSet/>
+      <dgm:spPr/>
+      <dgm:t>
+        <a:bodyPr/>
+        <a:lstStyle/>
+        <a:p>
+          <a:pPr latinLnBrk="1"/>
+          <a:endParaRPr lang="ko-KR" altLang="en-US"/>
+        </a:p>
+      </dgm:t>
+    </dgm:pt>
+    <dgm:pt modelId="{48D35456-7AD0-422A-B80E-7C8088041AA6}">
+      <dgm:prSet phldrT="[텍스트]"/>
+      <dgm:spPr/>
+      <dgm:t>
+        <a:bodyPr/>
+        <a:lstStyle/>
+        <a:p>
+          <a:pPr latinLnBrk="1"/>
+          <a:r>
+            <a:rPr lang="ko-KR" altLang="en-US" dirty="0">
+              <a:solidFill>
+                <a:schemeClr val="tx1"/>
+              </a:solidFill>
+            </a:rPr>
+            <a:t>커뮤니티 메타버스</a:t>
+          </a:r>
+        </a:p>
+      </dgm:t>
+    </dgm:pt>
+    <dgm:pt modelId="{321101BA-3C98-470D-9D55-DBEC56A5EED0}" type="parTrans" cxnId="{C80655A6-6B85-4AA1-92C9-22E5A8AEDF5D}">
+      <dgm:prSet/>
+      <dgm:spPr/>
+      <dgm:t>
+        <a:bodyPr/>
+        <a:lstStyle/>
+        <a:p>
+          <a:pPr latinLnBrk="1"/>
+          <a:endParaRPr lang="ko-KR" altLang="en-US"/>
+        </a:p>
+      </dgm:t>
+    </dgm:pt>
+    <dgm:pt modelId="{BB38EA02-7634-45EE-AA5B-2FE7BF57184B}" type="sibTrans" cxnId="{C80655A6-6B85-4AA1-92C9-22E5A8AEDF5D}">
+      <dgm:prSet/>
+      <dgm:spPr/>
+      <dgm:t>
+        <a:bodyPr/>
+        <a:lstStyle/>
+        <a:p>
+          <a:pPr latinLnBrk="1"/>
+          <a:endParaRPr lang="ko-KR" altLang="en-US"/>
+        </a:p>
+      </dgm:t>
+    </dgm:pt>
+    <dgm:pt modelId="{17873DA5-D2F9-4FCC-80C4-9497FDB42866}">
+      <dgm:prSet phldrT="[텍스트]"/>
+      <dgm:spPr/>
+      <dgm:t>
+        <a:bodyPr/>
+        <a:lstStyle/>
+        <a:p>
+          <a:pPr latinLnBrk="1"/>
+          <a:r>
+            <a:rPr lang="ko-KR" altLang="en-US" dirty="0">
+              <a:solidFill>
+                <a:schemeClr val="tx1"/>
+              </a:solidFill>
+            </a:rPr>
+            <a:t>커뮤니티 모바일 앱</a:t>
+          </a:r>
+        </a:p>
+      </dgm:t>
+    </dgm:pt>
+    <dgm:pt modelId="{818DA969-11D1-4D91-BBD2-CEFBCDD916D6}" type="parTrans" cxnId="{F1451902-ED2D-4DEB-9D6C-A334666CC7C1}">
+      <dgm:prSet/>
+      <dgm:spPr/>
+      <dgm:t>
+        <a:bodyPr/>
+        <a:lstStyle/>
+        <a:p>
+          <a:pPr latinLnBrk="1"/>
+          <a:endParaRPr lang="ko-KR" altLang="en-US"/>
+        </a:p>
+      </dgm:t>
+    </dgm:pt>
+    <dgm:pt modelId="{973B224B-2450-415B-96AC-4FD7B1426D89}" type="sibTrans" cxnId="{F1451902-ED2D-4DEB-9D6C-A334666CC7C1}">
+      <dgm:prSet/>
+      <dgm:spPr/>
+      <dgm:t>
+        <a:bodyPr/>
+        <a:lstStyle/>
+        <a:p>
+          <a:pPr latinLnBrk="1"/>
+          <a:endParaRPr lang="ko-KR" altLang="en-US"/>
+        </a:p>
+      </dgm:t>
+    </dgm:pt>
+    <dgm:pt modelId="{2607BE90-0F31-44B4-84DD-655B06B46230}" type="pres">
+      <dgm:prSet presAssocID="{EE1C41A2-44F6-4BB7-9738-5E24B809B6BA}" presName="Name0" presStyleCnt="0">
+        <dgm:presLayoutVars>
+          <dgm:dir/>
+          <dgm:animLvl val="lvl"/>
+          <dgm:resizeHandles val="exact"/>
+        </dgm:presLayoutVars>
+      </dgm:prSet>
+      <dgm:spPr/>
+    </dgm:pt>
+    <dgm:pt modelId="{042BFAC9-57E7-41FB-8643-ABF27DE3CEE3}" type="pres">
+      <dgm:prSet presAssocID="{58997698-761B-48BA-B4C8-3C4D8AC83ABD}" presName="parTxOnly" presStyleLbl="node1" presStyleIdx="0" presStyleCnt="4">
+        <dgm:presLayoutVars>
+          <dgm:chMax val="0"/>
+          <dgm:chPref val="0"/>
+          <dgm:bulletEnabled val="1"/>
+        </dgm:presLayoutVars>
+      </dgm:prSet>
+      <dgm:spPr/>
+    </dgm:pt>
+    <dgm:pt modelId="{93C4B1A8-2A41-4CB8-8977-742DB1D9D9F9}" type="pres">
+      <dgm:prSet presAssocID="{7A9B17A6-0C2D-42A6-8950-62F6008F060E}" presName="parTxOnlySpace" presStyleCnt="0"/>
+      <dgm:spPr/>
+    </dgm:pt>
+    <dgm:pt modelId="{19C84811-8C0C-4101-ABCC-6F56ED1623E0}" type="pres">
+      <dgm:prSet presAssocID="{17873DA5-D2F9-4FCC-80C4-9497FDB42866}" presName="parTxOnly" presStyleLbl="node1" presStyleIdx="1" presStyleCnt="4">
+        <dgm:presLayoutVars>
+          <dgm:chMax val="0"/>
+          <dgm:chPref val="0"/>
+          <dgm:bulletEnabled val="1"/>
+        </dgm:presLayoutVars>
+      </dgm:prSet>
+      <dgm:spPr/>
+    </dgm:pt>
+    <dgm:pt modelId="{84D34631-6ED9-4527-8D33-B74257D6E440}" type="pres">
+      <dgm:prSet presAssocID="{973B224B-2450-415B-96AC-4FD7B1426D89}" presName="parTxOnlySpace" presStyleCnt="0"/>
+      <dgm:spPr/>
+    </dgm:pt>
+    <dgm:pt modelId="{6CDFACC6-2535-4FF3-A13C-89D41C02938F}" type="pres">
+      <dgm:prSet presAssocID="{5C42E6EB-799F-4241-A8CB-181EE3F20BE6}" presName="parTxOnly" presStyleLbl="node1" presStyleIdx="2" presStyleCnt="4">
+        <dgm:presLayoutVars>
+          <dgm:chMax val="0"/>
+          <dgm:chPref val="0"/>
+          <dgm:bulletEnabled val="1"/>
+        </dgm:presLayoutVars>
+      </dgm:prSet>
+      <dgm:spPr/>
+    </dgm:pt>
+    <dgm:pt modelId="{F53D4C94-6672-4808-AC9C-7615F8B74477}" type="pres">
+      <dgm:prSet presAssocID="{1C983B6D-6A36-4E6A-AE2B-552E554EBBE7}" presName="parTxOnlySpace" presStyleCnt="0"/>
+      <dgm:spPr/>
+    </dgm:pt>
+    <dgm:pt modelId="{631EB1B5-2625-4391-96F6-CE05A986A4FC}" type="pres">
+      <dgm:prSet presAssocID="{48D35456-7AD0-422A-B80E-7C8088041AA6}" presName="parTxOnly" presStyleLbl="node1" presStyleIdx="3" presStyleCnt="4">
+        <dgm:presLayoutVars>
+          <dgm:chMax val="0"/>
+          <dgm:chPref val="0"/>
+          <dgm:bulletEnabled val="1"/>
+        </dgm:presLayoutVars>
+      </dgm:prSet>
+      <dgm:spPr/>
+    </dgm:pt>
+  </dgm:ptLst>
+  <dgm:cxnLst>
+    <dgm:cxn modelId="{F1451902-ED2D-4DEB-9D6C-A334666CC7C1}" srcId="{EE1C41A2-44F6-4BB7-9738-5E24B809B6BA}" destId="{17873DA5-D2F9-4FCC-80C4-9497FDB42866}" srcOrd="1" destOrd="0" parTransId="{818DA969-11D1-4D91-BBD2-CEFBCDD916D6}" sibTransId="{973B224B-2450-415B-96AC-4FD7B1426D89}"/>
+    <dgm:cxn modelId="{9691AA5F-C21E-4343-9E5E-615B4E7DDE64}" type="presOf" srcId="{58997698-761B-48BA-B4C8-3C4D8AC83ABD}" destId="{042BFAC9-57E7-41FB-8643-ABF27DE3CEE3}" srcOrd="0" destOrd="0" presId="urn:microsoft.com/office/officeart/2005/8/layout/chevron1"/>
+    <dgm:cxn modelId="{8746466F-15E5-4980-9A88-6F3735E9F4DD}" type="presOf" srcId="{17873DA5-D2F9-4FCC-80C4-9497FDB42866}" destId="{19C84811-8C0C-4101-ABCC-6F56ED1623E0}" srcOrd="0" destOrd="0" presId="urn:microsoft.com/office/officeart/2005/8/layout/chevron1"/>
+    <dgm:cxn modelId="{52C4AB50-7FDF-4238-A54B-916C97E1B9D7}" type="presOf" srcId="{5C42E6EB-799F-4241-A8CB-181EE3F20BE6}" destId="{6CDFACC6-2535-4FF3-A13C-89D41C02938F}" srcOrd="0" destOrd="0" presId="urn:microsoft.com/office/officeart/2005/8/layout/chevron1"/>
+    <dgm:cxn modelId="{0ADCC278-7F13-4778-B8C2-28E3729CCD95}" type="presOf" srcId="{EE1C41A2-44F6-4BB7-9738-5E24B809B6BA}" destId="{2607BE90-0F31-44B4-84DD-655B06B46230}" srcOrd="0" destOrd="0" presId="urn:microsoft.com/office/officeart/2005/8/layout/chevron1"/>
+    <dgm:cxn modelId="{C80655A6-6B85-4AA1-92C9-22E5A8AEDF5D}" srcId="{EE1C41A2-44F6-4BB7-9738-5E24B809B6BA}" destId="{48D35456-7AD0-422A-B80E-7C8088041AA6}" srcOrd="3" destOrd="0" parTransId="{321101BA-3C98-470D-9D55-DBEC56A5EED0}" sibTransId="{BB38EA02-7634-45EE-AA5B-2FE7BF57184B}"/>
+    <dgm:cxn modelId="{EDF47CC4-8CF9-4A88-B25E-BCA80D94DD0D}" srcId="{EE1C41A2-44F6-4BB7-9738-5E24B809B6BA}" destId="{58997698-761B-48BA-B4C8-3C4D8AC83ABD}" srcOrd="0" destOrd="0" parTransId="{0F77007B-88A7-4F2E-AB8A-B53A63CBC3D1}" sibTransId="{7A9B17A6-0C2D-42A6-8950-62F6008F060E}"/>
+    <dgm:cxn modelId="{09EB33CC-DA22-4638-B998-3943221EDFAC}" srcId="{EE1C41A2-44F6-4BB7-9738-5E24B809B6BA}" destId="{5C42E6EB-799F-4241-A8CB-181EE3F20BE6}" srcOrd="2" destOrd="0" parTransId="{8EF0F9E8-7A45-4AE9-9C99-EDAFF551C533}" sibTransId="{1C983B6D-6A36-4E6A-AE2B-552E554EBBE7}"/>
+    <dgm:cxn modelId="{05C6E3EF-894A-4184-A4EE-B2B3B0D066D7}" type="presOf" srcId="{48D35456-7AD0-422A-B80E-7C8088041AA6}" destId="{631EB1B5-2625-4391-96F6-CE05A986A4FC}" srcOrd="0" destOrd="0" presId="urn:microsoft.com/office/officeart/2005/8/layout/chevron1"/>
+    <dgm:cxn modelId="{53B78209-F571-4AB3-8DC4-17A9A19E85E5}" type="presParOf" srcId="{2607BE90-0F31-44B4-84DD-655B06B46230}" destId="{042BFAC9-57E7-41FB-8643-ABF27DE3CEE3}" srcOrd="0" destOrd="0" presId="urn:microsoft.com/office/officeart/2005/8/layout/chevron1"/>
+    <dgm:cxn modelId="{357240B4-B418-4EA0-9F62-443454E9923D}" type="presParOf" srcId="{2607BE90-0F31-44B4-84DD-655B06B46230}" destId="{93C4B1A8-2A41-4CB8-8977-742DB1D9D9F9}" srcOrd="1" destOrd="0" presId="urn:microsoft.com/office/officeart/2005/8/layout/chevron1"/>
+    <dgm:cxn modelId="{B0C2AE4E-FBA1-4583-91AD-4979FC84A15D}" type="presParOf" srcId="{2607BE90-0F31-44B4-84DD-655B06B46230}" destId="{19C84811-8C0C-4101-ABCC-6F56ED1623E0}" srcOrd="2" destOrd="0" presId="urn:microsoft.com/office/officeart/2005/8/layout/chevron1"/>
+    <dgm:cxn modelId="{C2FBEEC2-730A-4358-A022-2FF3DF740CB4}" type="presParOf" srcId="{2607BE90-0F31-44B4-84DD-655B06B46230}" destId="{84D34631-6ED9-4527-8D33-B74257D6E440}" srcOrd="3" destOrd="0" presId="urn:microsoft.com/office/officeart/2005/8/layout/chevron1"/>
+    <dgm:cxn modelId="{AC33A1EB-1060-4721-BA2A-4377ADEEC7EE}" type="presParOf" srcId="{2607BE90-0F31-44B4-84DD-655B06B46230}" destId="{6CDFACC6-2535-4FF3-A13C-89D41C02938F}" srcOrd="4" destOrd="0" presId="urn:microsoft.com/office/officeart/2005/8/layout/chevron1"/>
+    <dgm:cxn modelId="{AFF84020-E538-42D7-99D9-2ADFE92F07BD}" type="presParOf" srcId="{2607BE90-0F31-44B4-84DD-655B06B46230}" destId="{F53D4C94-6672-4808-AC9C-7615F8B74477}" srcOrd="5" destOrd="0" presId="urn:microsoft.com/office/officeart/2005/8/layout/chevron1"/>
+    <dgm:cxn modelId="{72B69BD1-3E6C-413D-B78E-CF525330D59F}" type="presParOf" srcId="{2607BE90-0F31-44B4-84DD-655B06B46230}" destId="{631EB1B5-2625-4391-96F6-CE05A986A4FC}" srcOrd="6" destOrd="0" presId="urn:microsoft.com/office/officeart/2005/8/layout/chevron1"/>
+  </dgm:cxnLst>
+  <dgm:bg/>
+  <dgm:whole/>
+  <dgm:extLst>
+    <a:ext uri="http://schemas.microsoft.com/office/drawing/2008/diagram">
+      <dsp:dataModelExt xmlns:dsp="http://schemas.microsoft.com/office/drawing/2008/diagram" relId="rId6" minVer="http://schemas.openxmlformats.org/drawingml/2006/diagram"/>
+    </a:ext>
+  </dgm:extLst>
+</dgm:dataModel>
+</file>
+
+<file path=ppt/diagrams/drawing1.xml><?xml version="1.0" encoding="utf-8"?>
+<dsp:drawing xmlns:dgm="http://schemas.openxmlformats.org/drawingml/2006/diagram" xmlns:dsp="http://schemas.microsoft.com/office/drawing/2008/diagram" xmlns:a="http://schemas.openxmlformats.org/drawingml/2006/main">
+  <dsp:spTree>
+    <dsp:nvGrpSpPr>
+      <dsp:cNvPr id="0" name=""/>
+      <dsp:cNvGrpSpPr/>
+    </dsp:nvGrpSpPr>
+    <dsp:grpSpPr/>
+    <dsp:sp modelId="{042BFAC9-57E7-41FB-8643-ABF27DE3CEE3}">
+      <dsp:nvSpPr>
+        <dsp:cNvPr id="0" name=""/>
+        <dsp:cNvSpPr/>
+      </dsp:nvSpPr>
+      <dsp:spPr>
+        <a:xfrm>
+          <a:off x="4602" y="871909"/>
+          <a:ext cx="2678914" cy="1071565"/>
+        </a:xfrm>
+        <a:prstGeom prst="chevron">
+          <a:avLst/>
+        </a:prstGeom>
+        <a:solidFill>
+          <a:schemeClr val="accent4">
+            <a:hueOff val="0"/>
+            <a:satOff val="0"/>
+            <a:lumOff val="0"/>
+            <a:alphaOff val="0"/>
+          </a:schemeClr>
+        </a:solidFill>
+        <a:ln w="12700" cap="flat" cmpd="sng" algn="ctr">
+          <a:solidFill>
+            <a:schemeClr val="lt1">
+              <a:hueOff val="0"/>
+              <a:satOff val="0"/>
+              <a:lumOff val="0"/>
+              <a:alphaOff val="0"/>
+            </a:schemeClr>
+          </a:solidFill>
+          <a:prstDash val="solid"/>
+          <a:miter lim="800000"/>
+        </a:ln>
+        <a:effectLst/>
+      </dsp:spPr>
+      <dsp:style>
+        <a:lnRef idx="2">
+          <a:scrgbClr r="0" g="0" b="0"/>
+        </a:lnRef>
+        <a:fillRef idx="1">
+          <a:scrgbClr r="0" g="0" b="0"/>
+        </a:fillRef>
+        <a:effectRef idx="0">
+          <a:scrgbClr r="0" g="0" b="0"/>
+        </a:effectRef>
+        <a:fontRef idx="minor">
+          <a:schemeClr val="lt1"/>
+        </a:fontRef>
+      </dsp:style>
+      <dsp:txBody>
+        <a:bodyPr spcFirstLastPara="0" vert="horz" wrap="square" lIns="100013" tIns="33338" rIns="33338" bIns="33338" numCol="1" spcCol="1270" anchor="ctr" anchorCtr="0">
+          <a:noAutofit/>
+        </a:bodyPr>
+        <a:lstStyle/>
+        <a:p>
+          <a:pPr marL="0" lvl="0" indent="0" algn="ctr" defTabSz="1111250" latinLnBrk="1">
+            <a:lnSpc>
+              <a:spcPct val="90000"/>
+            </a:lnSpc>
+            <a:spcBef>
+              <a:spcPct val="0"/>
+            </a:spcBef>
+            <a:spcAft>
+              <a:spcPct val="35000"/>
+            </a:spcAft>
+            <a:buNone/>
+          </a:pPr>
+          <a:r>
+            <a:rPr lang="ko-KR" altLang="en-US" sz="2500" kern="1200" dirty="0">
+              <a:solidFill>
+                <a:schemeClr val="tx1"/>
+              </a:solidFill>
+            </a:rPr>
+            <a:t>커뮤니티 웹사이트</a:t>
+          </a:r>
+        </a:p>
+      </dsp:txBody>
+      <dsp:txXfrm>
+        <a:off x="540385" y="871909"/>
+        <a:ext cx="1607349" cy="1071565"/>
+      </dsp:txXfrm>
+    </dsp:sp>
+    <dsp:sp modelId="{19C84811-8C0C-4101-ABCC-6F56ED1623E0}">
+      <dsp:nvSpPr>
+        <dsp:cNvPr id="0" name=""/>
+        <dsp:cNvSpPr/>
+      </dsp:nvSpPr>
+      <dsp:spPr>
+        <a:xfrm>
+          <a:off x="2415625" y="871909"/>
+          <a:ext cx="2678914" cy="1071565"/>
+        </a:xfrm>
+        <a:prstGeom prst="chevron">
+          <a:avLst/>
+        </a:prstGeom>
+        <a:solidFill>
+          <a:schemeClr val="accent4">
+            <a:hueOff val="3266964"/>
+            <a:satOff val="-13592"/>
+            <a:lumOff val="3203"/>
+            <a:alphaOff val="0"/>
+          </a:schemeClr>
+        </a:solidFill>
+        <a:ln w="12700" cap="flat" cmpd="sng" algn="ctr">
+          <a:solidFill>
+            <a:schemeClr val="lt1">
+              <a:hueOff val="0"/>
+              <a:satOff val="0"/>
+              <a:lumOff val="0"/>
+              <a:alphaOff val="0"/>
+            </a:schemeClr>
+          </a:solidFill>
+          <a:prstDash val="solid"/>
+          <a:miter lim="800000"/>
+        </a:ln>
+        <a:effectLst/>
+      </dsp:spPr>
+      <dsp:style>
+        <a:lnRef idx="2">
+          <a:scrgbClr r="0" g="0" b="0"/>
+        </a:lnRef>
+        <a:fillRef idx="1">
+          <a:scrgbClr r="0" g="0" b="0"/>
+        </a:fillRef>
+        <a:effectRef idx="0">
+          <a:scrgbClr r="0" g="0" b="0"/>
+        </a:effectRef>
+        <a:fontRef idx="minor">
+          <a:schemeClr val="lt1"/>
+        </a:fontRef>
+      </dsp:style>
+      <dsp:txBody>
+        <a:bodyPr spcFirstLastPara="0" vert="horz" wrap="square" lIns="100013" tIns="33338" rIns="33338" bIns="33338" numCol="1" spcCol="1270" anchor="ctr" anchorCtr="0">
+          <a:noAutofit/>
+        </a:bodyPr>
+        <a:lstStyle/>
+        <a:p>
+          <a:pPr marL="0" lvl="0" indent="0" algn="ctr" defTabSz="1111250" latinLnBrk="1">
+            <a:lnSpc>
+              <a:spcPct val="90000"/>
+            </a:lnSpc>
+            <a:spcBef>
+              <a:spcPct val="0"/>
+            </a:spcBef>
+            <a:spcAft>
+              <a:spcPct val="35000"/>
+            </a:spcAft>
+            <a:buNone/>
+          </a:pPr>
+          <a:r>
+            <a:rPr lang="ko-KR" altLang="en-US" sz="2500" kern="1200" dirty="0">
+              <a:solidFill>
+                <a:schemeClr val="tx1"/>
+              </a:solidFill>
+            </a:rPr>
+            <a:t>커뮤니티 모바일 앱</a:t>
+          </a:r>
+        </a:p>
+      </dsp:txBody>
+      <dsp:txXfrm>
+        <a:off x="2951408" y="871909"/>
+        <a:ext cx="1607349" cy="1071565"/>
+      </dsp:txXfrm>
+    </dsp:sp>
+    <dsp:sp modelId="{6CDFACC6-2535-4FF3-A13C-89D41C02938F}">
+      <dsp:nvSpPr>
+        <dsp:cNvPr id="0" name=""/>
+        <dsp:cNvSpPr/>
+      </dsp:nvSpPr>
+      <dsp:spPr>
+        <a:xfrm>
+          <a:off x="4826648" y="871909"/>
+          <a:ext cx="2678914" cy="1071565"/>
+        </a:xfrm>
+        <a:prstGeom prst="chevron">
+          <a:avLst/>
+        </a:prstGeom>
+        <a:solidFill>
+          <a:schemeClr val="accent4">
+            <a:hueOff val="6533927"/>
+            <a:satOff val="-27185"/>
+            <a:lumOff val="6405"/>
+            <a:alphaOff val="0"/>
+          </a:schemeClr>
+        </a:solidFill>
+        <a:ln w="12700" cap="flat" cmpd="sng" algn="ctr">
+          <a:solidFill>
+            <a:schemeClr val="lt1">
+              <a:hueOff val="0"/>
+              <a:satOff val="0"/>
+              <a:lumOff val="0"/>
+              <a:alphaOff val="0"/>
+            </a:schemeClr>
+          </a:solidFill>
+          <a:prstDash val="solid"/>
+          <a:miter lim="800000"/>
+        </a:ln>
+        <a:effectLst/>
+      </dsp:spPr>
+      <dsp:style>
+        <a:lnRef idx="2">
+          <a:scrgbClr r="0" g="0" b="0"/>
+        </a:lnRef>
+        <a:fillRef idx="1">
+          <a:scrgbClr r="0" g="0" b="0"/>
+        </a:fillRef>
+        <a:effectRef idx="0">
+          <a:scrgbClr r="0" g="0" b="0"/>
+        </a:effectRef>
+        <a:fontRef idx="minor">
+          <a:schemeClr val="lt1"/>
+        </a:fontRef>
+      </dsp:style>
+      <dsp:txBody>
+        <a:bodyPr spcFirstLastPara="0" vert="horz" wrap="square" lIns="100013" tIns="33338" rIns="33338" bIns="33338" numCol="1" spcCol="1270" anchor="ctr" anchorCtr="0">
+          <a:noAutofit/>
+        </a:bodyPr>
+        <a:lstStyle/>
+        <a:p>
+          <a:pPr marL="0" lvl="0" indent="0" algn="ctr" defTabSz="1111250" latinLnBrk="1">
+            <a:lnSpc>
+              <a:spcPct val="90000"/>
+            </a:lnSpc>
+            <a:spcBef>
+              <a:spcPct val="0"/>
+            </a:spcBef>
+            <a:spcAft>
+              <a:spcPct val="35000"/>
+            </a:spcAft>
+            <a:buNone/>
+          </a:pPr>
+          <a:r>
+            <a:rPr lang="en-US" altLang="ko-KR" sz="2500" kern="1200" dirty="0">
+              <a:solidFill>
+                <a:schemeClr val="tx1"/>
+              </a:solidFill>
+            </a:rPr>
+            <a:t>IDE</a:t>
+          </a:r>
+          <a:endParaRPr lang="ko-KR" altLang="en-US" sz="2500" kern="1200" dirty="0">
+            <a:solidFill>
+              <a:schemeClr val="tx1"/>
+            </a:solidFill>
+          </a:endParaRPr>
+        </a:p>
+      </dsp:txBody>
+      <dsp:txXfrm>
+        <a:off x="5362431" y="871909"/>
+        <a:ext cx="1607349" cy="1071565"/>
+      </dsp:txXfrm>
+    </dsp:sp>
+    <dsp:sp modelId="{631EB1B5-2625-4391-96F6-CE05A986A4FC}">
+      <dsp:nvSpPr>
+        <dsp:cNvPr id="0" name=""/>
+        <dsp:cNvSpPr/>
+      </dsp:nvSpPr>
+      <dsp:spPr>
+        <a:xfrm>
+          <a:off x="7237671" y="871909"/>
+          <a:ext cx="2678914" cy="1071565"/>
+        </a:xfrm>
+        <a:prstGeom prst="chevron">
+          <a:avLst/>
+        </a:prstGeom>
+        <a:solidFill>
+          <a:schemeClr val="accent4">
+            <a:hueOff val="9800891"/>
+            <a:satOff val="-40777"/>
+            <a:lumOff val="9608"/>
+            <a:alphaOff val="0"/>
+          </a:schemeClr>
+        </a:solidFill>
+        <a:ln w="12700" cap="flat" cmpd="sng" algn="ctr">
+          <a:solidFill>
+            <a:schemeClr val="lt1">
+              <a:hueOff val="0"/>
+              <a:satOff val="0"/>
+              <a:lumOff val="0"/>
+              <a:alphaOff val="0"/>
+            </a:schemeClr>
+          </a:solidFill>
+          <a:prstDash val="solid"/>
+          <a:miter lim="800000"/>
+        </a:ln>
+        <a:effectLst/>
+      </dsp:spPr>
+      <dsp:style>
+        <a:lnRef idx="2">
+          <a:scrgbClr r="0" g="0" b="0"/>
+        </a:lnRef>
+        <a:fillRef idx="1">
+          <a:scrgbClr r="0" g="0" b="0"/>
+        </a:fillRef>
+        <a:effectRef idx="0">
+          <a:scrgbClr r="0" g="0" b="0"/>
+        </a:effectRef>
+        <a:fontRef idx="minor">
+          <a:schemeClr val="lt1"/>
+        </a:fontRef>
+      </dsp:style>
+      <dsp:txBody>
+        <a:bodyPr spcFirstLastPara="0" vert="horz" wrap="square" lIns="100013" tIns="33338" rIns="33338" bIns="33338" numCol="1" spcCol="1270" anchor="ctr" anchorCtr="0">
+          <a:noAutofit/>
+        </a:bodyPr>
+        <a:lstStyle/>
+        <a:p>
+          <a:pPr marL="0" lvl="0" indent="0" algn="ctr" defTabSz="1111250" latinLnBrk="1">
+            <a:lnSpc>
+              <a:spcPct val="90000"/>
+            </a:lnSpc>
+            <a:spcBef>
+              <a:spcPct val="0"/>
+            </a:spcBef>
+            <a:spcAft>
+              <a:spcPct val="35000"/>
+            </a:spcAft>
+            <a:buNone/>
+          </a:pPr>
+          <a:r>
+            <a:rPr lang="ko-KR" altLang="en-US" sz="2500" kern="1200" dirty="0">
+              <a:solidFill>
+                <a:schemeClr val="tx1"/>
+              </a:solidFill>
+            </a:rPr>
+            <a:t>커뮤니티 메타버스</a:t>
+          </a:r>
+        </a:p>
+      </dsp:txBody>
+      <dsp:txXfrm>
+        <a:off x="7773454" y="871909"/>
+        <a:ext cx="1607349" cy="1071565"/>
+      </dsp:txXfrm>
+    </dsp:sp>
+  </dsp:spTree>
+</dsp:drawing>
+</file>
+
+<file path=ppt/diagrams/layout1.xml><?xml version="1.0" encoding="utf-8"?>
+<dgm:layoutDef xmlns:dgm="http://schemas.openxmlformats.org/drawingml/2006/diagram" xmlns:a="http://schemas.openxmlformats.org/drawingml/2006/main" uniqueId="urn:microsoft.com/office/officeart/2005/8/layout/chevron1">
+  <dgm:title val=""/>
+  <dgm:desc val=""/>
+  <dgm:catLst>
+    <dgm:cat type="process" pri="9000"/>
+  </dgm:catLst>
+  <dgm:sampData useDef="1">
+    <dgm:dataModel>
+      <dgm:ptLst/>
+      <dgm:bg/>
+      <dgm:whole/>
+    </dgm:dataModel>
+  </dgm:sampData>
+  <dgm:styleData>
+    <dgm:dataModel>
+      <dgm:ptLst>
+        <dgm:pt modelId="0" type="doc"/>
+        <dgm:pt modelId="1"/>
+        <dgm:pt modelId="2"/>
+      </dgm:ptLst>
+      <dgm:cxnLst>
+        <dgm:cxn modelId="3" srcId="0" destId="1" srcOrd="0" destOrd="0"/>
+        <dgm:cxn modelId="4" srcId="0" destId="2" srcOrd="1" destOrd="0"/>
+      </dgm:cxnLst>
+      <dgm:bg/>
+      <dgm:whole/>
+    </dgm:dataModel>
+  </dgm:styleData>
+  <dgm:clrData>
+    <dgm:dataModel>
+      <dgm:ptLst>
+        <dgm:pt modelId="0" type="doc"/>
+        <dgm:pt modelId="1"/>
+        <dgm:pt modelId="2"/>
+        <dgm:pt modelId="3"/>
+        <dgm:pt modelId="4"/>
+      </dgm:ptLst>
+      <dgm:cxnLst>
+        <dgm:cxn modelId="5" srcId="0" destId="1" srcOrd="0" destOrd="0"/>
+        <dgm:cxn modelId="6" srcId="0" destId="2" srcOrd="1" destOrd="0"/>
+        <dgm:cxn modelId="7" srcId="0" destId="3" srcOrd="2" destOrd="0"/>
+        <dgm:cxn modelId="8" srcId="0" destId="4" srcOrd="3" destOrd="0"/>
+      </dgm:cxnLst>
+      <dgm:bg/>
+      <dgm:whole/>
+    </dgm:dataModel>
+  </dgm:clrData>
+  <dgm:layoutNode name="Name0">
+    <dgm:varLst>
+      <dgm:dir/>
+      <dgm:animLvl val="lvl"/>
+      <dgm:resizeHandles val="exact"/>
+    </dgm:varLst>
+    <dgm:choose name="Name1">
+      <dgm:if name="Name2" func="var" arg="dir" op="equ" val="norm">
+        <dgm:alg type="lin"/>
+      </dgm:if>
+      <dgm:else name="Name3">
+        <dgm:alg type="lin">
+          <dgm:param type="linDir" val="fromR"/>
+        </dgm:alg>
+      </dgm:else>
+    </dgm:choose>
+    <dgm:shape xmlns:r="http://schemas.openxmlformats.org/officeDocument/2006/relationships" r:blip="">
+      <dgm:adjLst/>
+    </dgm:shape>
+    <dgm:presOf/>
+    <dgm:choose name="Name4">
+      <dgm:if name="Name5" axis="des" func="maxDepth" op="gte" val="2">
+        <dgm:constrLst>
+          <dgm:constr type="h" for="ch" forName="composite" refType="h"/>
+          <dgm:constr type="w" for="ch" forName="composite" refType="w"/>
+          <dgm:constr type="w" for="des" forName="parTx"/>
+          <dgm:constr type="h" for="des" forName="parTx" op="equ"/>
+          <dgm:constr type="w" for="des" forName="desTx"/>
+          <dgm:constr type="h" for="des" forName="desTx" op="equ"/>
+          <dgm:constr type="primFontSz" for="des" forName="parTx" val="65"/>
+          <dgm:constr type="secFontSz" for="des" forName="desTx" refType="primFontSz" refFor="des" refForName="parTx" op="equ"/>
+          <dgm:constr type="h" for="des" forName="parTx" refType="primFontSz" refFor="des" refForName="parTx" fact="1.5"/>
+          <dgm:constr type="h" for="des" forName="desTx" refType="primFontSz" refFor="des" refForName="parTx" fact="0.5"/>
+          <dgm:constr type="w" for="ch" forName="space" op="equ" val="-6"/>
+        </dgm:constrLst>
+        <dgm:ruleLst>
+          <dgm:rule type="w" for="ch" forName="composite" val="0" fact="NaN" max="NaN"/>
+          <dgm:rule type="primFontSz" for="des" forName="parTx" val="5" fact="NaN" max="NaN"/>
+        </dgm:ruleLst>
+        <dgm:forEach name="Name6" axis="ch" ptType="node">
+          <dgm:layoutNode name="composite">
+            <dgm:alg type="composite"/>
+            <dgm:shape xmlns:r="http://schemas.openxmlformats.org/officeDocument/2006/relationships" r:blip="">
+              <dgm:adjLst/>
+            </dgm:shape>
+            <dgm:presOf/>
+            <dgm:choose name="Name7">
+              <dgm:if name="Name8" func="var" arg="dir" op="equ" val="norm">
+                <dgm:constrLst>
+                  <dgm:constr type="l" for="ch" forName="parTx"/>
+                  <dgm:constr type="w" for="ch" forName="parTx" refType="w"/>
+                  <dgm:constr type="t" for="ch" forName="parTx"/>
+                  <dgm:constr type="l" for="ch" forName="desTx"/>
+                  <dgm:constr type="w" for="ch" forName="desTx" refType="w" refFor="ch" refForName="parTx" fact="0.8"/>
+                  <dgm:constr type="t" for="ch" forName="desTx" refType="h" refFor="ch" refForName="parTx" fact="1.125"/>
+                </dgm:constrLst>
+              </dgm:if>
+              <dgm:else name="Name9">
+                <dgm:constrLst>
+                  <dgm:constr type="l" for="ch" forName="parTx"/>
+                  <dgm:constr type="w" for="ch" forName="parTx" refType="w"/>
+                  <dgm:constr type="t" for="ch" forName="parTx"/>
+                  <dgm:constr type="l" for="ch" forName="desTx" refType="w" fact="0.2"/>
+                  <dgm:constr type="w" for="ch" forName="desTx" refType="w" refFor="ch" refForName="parTx" fact="0.8"/>
+                  <dgm:constr type="t" for="ch" forName="desTx" refType="h" refFor="ch" refForName="parTx" fact="1.125"/>
+                </dgm:constrLst>
+              </dgm:else>
+            </dgm:choose>
+            <dgm:ruleLst>
+              <dgm:rule type="h" val="INF" fact="NaN" max="NaN"/>
+            </dgm:ruleLst>
+            <dgm:layoutNode name="parTx">
+              <dgm:varLst>
+                <dgm:chMax val="0"/>
+                <dgm:chPref val="0"/>
+                <dgm:bulletEnabled val="1"/>
+              </dgm:varLst>
+              <dgm:alg type="tx"/>
+              <dgm:choose name="Name10">
+                <dgm:if name="Name11" func="var" arg="dir" op="equ" val="norm">
+                  <dgm:shape xmlns:r="http://schemas.openxmlformats.org/officeDocument/2006/relationships" type="chevron" r:blip="">
+                    <dgm:adjLst/>
+                  </dgm:shape>
+                </dgm:if>
+                <dgm:else name="Name12">
+                  <dgm:shape xmlns:r="http://schemas.openxmlformats.org/officeDocument/2006/relationships" rot="180" type="chevron" r:blip="">
+                    <dgm:adjLst/>
+                  </dgm:shape>
+                </dgm:else>
+              </dgm:choose>
+              <dgm:presOf axis="self" ptType="node"/>
+              <dgm:choose name="Name13">
+                <dgm:if name="Name14" func="var" arg="dir" op="equ" val="norm">
+                  <dgm:constrLst>
+                    <dgm:constr type="h" refType="w" op="lte" fact="0.4"/>
+                    <dgm:constr type="h"/>
+                    <dgm:constr type="tMarg" refType="primFontSz" fact="0.105"/>
+                    <dgm:constr type="bMarg" refType="primFontSz" fact="0.105"/>
+                    <dgm:constr type="lMarg" refType="primFontSz" fact="0.315"/>
+                    <dgm:constr type="rMarg" refType="primFontSz" fact="0.105"/>
+                  </dgm:constrLst>
+                </dgm:if>
+                <dgm:else name="Name15">
+                  <dgm:constrLst>
+                    <dgm:constr type="h" refType="w" op="lte" fact="0.4"/>
+                    <dgm:constr type="h"/>
+                    <dgm:constr type="tMarg" refType="primFontSz" fact="0.105"/>
+                    <dgm:constr type="bMarg" refType="primFontSz" fact="0.105"/>
+                    <dgm:constr type="lMarg" refType="primFontSz" fact="0.105"/>
+                    <dgm:constr type="rMarg" refType="primFontSz" fact="0.315"/>
+                  </dgm:constrLst>
+                </dgm:else>
+              </dgm:choose>
+              <dgm:ruleLst>
+                <dgm:rule type="h" val="INF" fact="NaN" max="NaN"/>
+              </dgm:ruleLst>
+            </dgm:layoutNode>
+            <dgm:layoutNode name="desTx" styleLbl="revTx">
+              <dgm:varLst>
+                <dgm:bulletEnabled val="1"/>
+              </dgm:varLst>
+              <dgm:alg type="tx">
+                <dgm:param type="stBulletLvl" val="1"/>
+              </dgm:alg>
+              <dgm:choose name="Name16">
+                <dgm:if name="Name17" axis="ch" ptType="node" func="cnt" op="gte" val="1">
+                  <dgm:shape xmlns:r="http://schemas.openxmlformats.org/officeDocument/2006/relationships" type="rect" r:blip="">
+                    <dgm:adjLst/>
+                  </dgm:shape>
+                </dgm:if>
+                <dgm:else name="Name18">
+                  <dgm:shape xmlns:r="http://schemas.openxmlformats.org/officeDocument/2006/relationships" type="rect" r:blip="" hideGeom="1">
+                    <dgm:adjLst/>
+                  </dgm:shape>
+                </dgm:else>
+              </dgm:choose>
+              <dgm:presOf axis="des" ptType="node"/>
+              <dgm:constrLst>
+                <dgm:constr type="secFontSz" val="65"/>
+                <dgm:constr type="primFontSz" refType="secFontSz"/>
+                <dgm:constr type="h"/>
+                <dgm:constr type="tMarg"/>
+                <dgm:constr type="bMarg"/>
+                <dgm:constr type="rMarg"/>
+                <dgm:constr type="lMarg"/>
+              </dgm:constrLst>
+              <dgm:ruleLst>
+                <dgm:rule type="h" val="INF" fact="NaN" max="NaN"/>
+              </dgm:ruleLst>
+            </dgm:layoutNode>
+          </dgm:layoutNode>
+          <dgm:forEach name="Name19" axis="followSib" ptType="sibTrans" cnt="1">
+            <dgm:layoutNode name="space">
+              <dgm:alg type="sp"/>
+              <dgm:shape xmlns:r="http://schemas.openxmlformats.org/officeDocument/2006/relationships" r:blip="">
+                <dgm:adjLst/>
+              </dgm:shape>
+              <dgm:presOf/>
+              <dgm:constrLst/>
+              <dgm:ruleLst/>
+            </dgm:layoutNode>
+          </dgm:forEach>
+        </dgm:forEach>
+      </dgm:if>
+      <dgm:else name="Name20">
+        <dgm:constrLst>
+          <dgm:constr type="w" for="ch" forName="parTxOnly" refType="w"/>
+          <dgm:constr type="h" for="des" forName="parTxOnly" op="equ"/>
+          <dgm:constr type="primFontSz" for="des" forName="parTxOnly" op="equ" val="65"/>
+          <dgm:constr type="w" for="ch" forName="parTxOnlySpace" refType="w" refFor="ch" refForName="parTxOnly" fact="-0.1"/>
+        </dgm:constrLst>
+        <dgm:ruleLst/>
+        <dgm:forEach name="Name21" axis="ch" ptType="node">
+          <dgm:layoutNode name="parTxOnly">
+            <dgm:varLst>
+              <dgm:chMax val="0"/>
+              <dgm:chPref val="0"/>
+              <dgm:bulletEnabled val="1"/>
+            </dgm:varLst>
+            <dgm:alg type="tx"/>
+            <dgm:choose name="Name22">
+              <dgm:if name="Name23" func="var" arg="dir" op="equ" val="norm">
+                <dgm:shape xmlns:r="http://schemas.openxmlformats.org/officeDocument/2006/relationships" type="chevron" r:blip="">
+                  <dgm:adjLst/>
+                </dgm:shape>
+              </dgm:if>
+              <dgm:else name="Name24">
+                <dgm:shape xmlns:r="http://schemas.openxmlformats.org/officeDocument/2006/relationships" rot="180" type="chevron" r:blip="">
+                  <dgm:adjLst/>
+                </dgm:shape>
+              </dgm:else>
+            </dgm:choose>
+            <dgm:presOf axis="self" ptType="node"/>
+            <dgm:choose name="Name25">
+              <dgm:if name="Name26" func="var" arg="dir" op="equ" val="norm">
+                <dgm:constrLst>
+                  <dgm:constr type="h" refType="w" op="equ" fact="0.4"/>
+                  <dgm:constr type="tMarg" refType="primFontSz" fact="0.105"/>
+                  <dgm:constr type="bMarg" refType="primFontSz" fact="0.105"/>
+                  <dgm:constr type="lMarg" refType="primFontSz" fact="0.315"/>
+                  <dgm:constr type="rMarg" refType="primFontSz" fact="0.105"/>
+                </dgm:constrLst>
+              </dgm:if>
+              <dgm:else name="Name27">
+                <dgm:constrLst>
+                  <dgm:constr type="h" refType="w" op="equ" fact="0.4"/>
+                  <dgm:constr type="tMarg" refType="primFontSz" fact="0.105"/>
+                  <dgm:constr type="bMarg" refType="primFontSz" fact="0.105"/>
+                  <dgm:constr type="lMarg" refType="primFontSz" fact="0.105"/>
+                  <dgm:constr type="rMarg" refType="primFontSz" fact="0.315"/>
+                </dgm:constrLst>
+              </dgm:else>
+            </dgm:choose>
+            <dgm:ruleLst>
+              <dgm:rule type="primFontSz" val="5" fact="NaN" max="NaN"/>
+            </dgm:ruleLst>
+          </dgm:layoutNode>
+          <dgm:forEach name="Name28" axis="followSib" ptType="sibTrans" cnt="1">
+            <dgm:layoutNode name="parTxOnlySpace">
+              <dgm:alg type="sp"/>
+              <dgm:shape xmlns:r="http://schemas.openxmlformats.org/officeDocument/2006/relationships" r:blip="">
+                <dgm:adjLst/>
+              </dgm:shape>
+              <dgm:presOf/>
+              <dgm:constrLst/>
+              <dgm:ruleLst/>
+            </dgm:layoutNode>
+          </dgm:forEach>
+        </dgm:forEach>
+      </dgm:else>
+    </dgm:choose>
+  </dgm:layoutNode>
+</dgm:layoutDef>
+</file>
+
+<file path=ppt/diagrams/quickStyle1.xml><?xml version="1.0" encoding="utf-8"?>
+<dgm:styleDef xmlns:dgm="http://schemas.openxmlformats.org/drawingml/2006/diagram" xmlns:a="http://schemas.openxmlformats.org/drawingml/2006/main" uniqueId="urn:microsoft.com/office/officeart/2005/8/quickstyle/simple1">
+  <dgm:title val=""/>
+  <dgm:desc val=""/>
+  <dgm:catLst>
+    <dgm:cat type="simple" pri="10100"/>
+  </dgm:catLst>
+  <dgm:scene3d>
+    <a:camera prst="orthographicFront"/>
+    <a:lightRig rig="threePt" dir="t"/>
+  </dgm:scene3d>
+  <dgm:styleLbl name="node0">
+    <dgm:scene3d>
+      <a:camera prst="orthographicFront"/>
+      <a:lightRig rig="threePt" dir="t"/>
+    </dgm:scene3d>
+    <dgm:sp3d/>
+    <dgm:txPr/>
+    <dgm:style>
+      <a:lnRef idx="2">
+        <a:scrgbClr r="0" g="0" b="0"/>
+      </a:lnRef>
+      <a:fillRef idx="1">
+        <a:scrgbClr r="0" g="0" b="0"/>
+      </a:fillRef>
+      <a:effectRef idx="0">
+        <a:scrgbClr r="0" g="0" b="0"/>
+      </a:effectRef>
+      <a:fontRef idx="minor">
+        <a:schemeClr val="lt1"/>
+      </a:fontRef>
+    </dgm:style>
+  </dgm:styleLbl>
+  <dgm:styleLbl name="lnNode1">
+    <dgm:scene3d>
+      <a:camera prst="orthographicFront"/>
+      <a:lightRig rig="threePt" dir="t"/>
+    </dgm:scene3d>
+    <dgm:sp3d/>
+    <dgm:txPr/>
+    <dgm:style>
+      <a:lnRef idx="2">
+        <a:scrgbClr r="0" g="0" b="0"/>
+      </a:lnRef>
+      <a:fillRef idx="1">
+        <a:scrgbClr r="0" g="0" b="0"/>
+      </a:fillRef>
+      <a:effectRef idx="0">
+        <a:scrgbClr r="0" g="0" b="0"/>
+      </a:effectRef>
+      <a:fontRef idx="minor">
+        <a:schemeClr val="lt1"/>
+      </a:fontRef>
+    </dgm:style>
+  </dgm:styleLbl>
+  <dgm:styleLbl name="vennNode1">
+    <dgm:scene3d>
+      <a:camera prst="orthographicFront"/>
+      <a:lightRig rig="threePt" dir="t"/>
+    </dgm:scene3d>
+    <dgm:sp3d/>
+    <dgm:txPr/>
+    <dgm:style>
+      <a:lnRef idx="2">
+        <a:scrgbClr r="0" g="0" b="0"/>
+      </a:lnRef>
+      <a:fillRef idx="1">
+        <a:scrgbClr r="0" g="0" b="0"/>
+      </a:fillRef>
+      <a:effectRef idx="0">
+        <a:scrgbClr r="0" g="0" b="0"/>
+      </a:effectRef>
+      <a:fontRef idx="minor">
+        <a:schemeClr val="tx1"/>
+      </a:fontRef>
+    </dgm:style>
+  </dgm:styleLbl>
+  <dgm:styleLbl name="alignNode1">
+    <dgm:scene3d>
+      <a:camera prst="orthographicFront"/>
+      <a:lightRig rig="threePt" dir="t"/>
+    </dgm:scene3d>
+    <dgm:sp3d/>
+    <dgm:txPr/>
+    <dgm:style>
+      <a:lnRef idx="2">
+        <a:scrgbClr r="0" g="0" b="0"/>
+      </a:lnRef>
+      <a:fillRef idx="1">
+        <a:scrgbClr r="0" g="0" b="0"/>
+      </a:fillRef>
+      <a:effectRef idx="0">
+        <a:scrgbClr r="0" g="0" b="0"/>
+      </a:effectRef>
+      <a:fontRef idx="minor">
+        <a:schemeClr val="lt1"/>
+      </a:fontRef>
+    </dgm:style>
+  </dgm:styleLbl>
+  <dgm:styleLbl name="node1">
+    <dgm:scene3d>
+      <a:camera prst="orthographicFront"/>
+      <a:lightRig rig="threePt" dir="t"/>
+    </dgm:scene3d>
+    <dgm:sp3d/>
+    <dgm:txPr/>
+    <dgm:style>
+      <a:lnRef idx="2">
+        <a:scrgbClr r="0" g="0" b="0"/>
+      </a:lnRef>
+      <a:fillRef idx="1">
+        <a:scrgbClr r="0" g="0" b="0"/>
+      </a:fillRef>
+      <a:effectRef idx="0">
+        <a:scrgbClr r="0" g="0" b="0"/>
+      </a:effectRef>
+      <a:fontRef idx="minor">
+        <a:schemeClr val="lt1"/>
+      </a:fontRef>
+    </dgm:style>
+  </dgm:styleLbl>
+  <dgm:styleLbl name="node2">
+    <dgm:scene3d>
+      <a:camera prst="orthographicFront"/>
+      <a:lightRig rig="threePt" dir="t"/>
+    </dgm:scene3d>
+    <dgm:sp3d/>
+    <dgm:txPr/>
+    <dgm:style>
+      <a:lnRef idx="2">
+        <a:scrgbClr r="0" g="0" b="0"/>
+      </a:lnRef>
+      <a:fillRef idx="1">
+        <a:scrgbClr r="0" g="0" b="0"/>
+      </a:fillRef>
+      <a:effectRef idx="0">
+        <a:scrgbClr r="0" g="0" b="0"/>
+      </a:effectRef>
+      <a:fontRef idx="minor">
+        <a:schemeClr val="lt1"/>
+      </a:fontRef>
+    </dgm:style>
+  </dgm:styleLbl>
+  <dgm:styleLbl name="node3">
+    <dgm:scene3d>
+      <a:camera prst="orthographicFront"/>
+      <a:lightRig rig="threePt" dir="t"/>
+    </dgm:scene3d>
+    <dgm:sp3d/>
+    <dgm:txPr/>
+    <dgm:style>
+      <a:lnRef idx="2">
+        <a:scrgbClr r="0" g="0" b="0"/>
+      </a:lnRef>
+      <a:fillRef idx="1">
+        <a:scrgbClr r="0" g="0" b="0"/>
+      </a:fillRef>
+      <a:effectRef idx="0">
+        <a:scrgbClr r="0" g="0" b="0"/>
+      </a:effectRef>
+      <a:fontRef idx="minor">
+        <a:schemeClr val="lt1"/>
+      </a:fontRef>
+    </dgm:style>
+  </dgm:styleLbl>
+  <dgm:styleLbl name="node4">
+    <dgm:scene3d>
+      <a:camera prst="orthographicFront"/>
+      <a:lightRig rig="threePt" dir="t"/>
+    </dgm:scene3d>
+    <dgm:sp3d/>
+    <dgm:txPr/>
+    <dgm:style>
+      <a:lnRef idx="2">
+        <a:scrgbClr r="0" g="0" b="0"/>
+      </a:lnRef>
+      <a:fillRef idx="1">
+        <a:scrgbClr r="0" g="0" b="0"/>
+      </a:fillRef>
+      <a:effectRef idx="0">
+        <a:scrgbClr r="0" g="0" b="0"/>
+      </a:effectRef>
+      <a:fontRef idx="minor">
+        <a:schemeClr val="lt1"/>
+      </a:fontRef>
+    </dgm:style>
+  </dgm:styleLbl>
+  <dgm:styleLbl name="fgImgPlace1">
+    <dgm:scene3d>
+      <a:camera prst="orthographicFront"/>
+      <a:lightRig rig="threePt" dir="t"/>
+    </dgm:scene3d>
+    <dgm:sp3d/>
+    <dgm:txPr/>
+    <dgm:style>
+      <a:lnRef idx="2">
+        <a:scrgbClr r="0" g="0" b="0"/>
+      </a:lnRef>
+      <a:fillRef idx="1">
+        <a:scrgbClr r="0" g="0" b="0"/>
+      </a:fillRef>
+      <a:effectRef idx="0">
+        <a:scrgbClr r="0" g="0" b="0"/>
+      </a:effectRef>
+      <a:fontRef idx="minor"/>
+    </dgm:style>
+  </dgm:styleLbl>
+  <dgm:styleLbl name="alignImgPlace1">
+    <dgm:scene3d>
+      <a:camera prst="orthographicFront"/>
+      <a:lightRig rig="threePt" dir="t"/>
+    </dgm:scene3d>
+    <dgm:sp3d/>
+    <dgm:txPr/>
+    <dgm:style>
+      <a:lnRef idx="2">
+        <a:scrgbClr r="0" g="0" b="0"/>
+      </a:lnRef>
+      <a:fillRef idx="1">
+        <a:scrgbClr r="0" g="0" b="0"/>
+      </a:fillRef>
+      <a:effectRef idx="0">
+        <a:scrgbClr r="0" g="0" b="0"/>
+      </a:effectRef>
+      <a:fontRef idx="minor"/>
+    </dgm:style>
+  </dgm:styleLbl>
+  <dgm:styleLbl name="bgImgPlace1">
+    <dgm:scene3d>
+      <a:camera prst="orthographicFront"/>
+      <a:lightRig rig="threePt" dir="t"/>
+    </dgm:scene3d>
+    <dgm:sp3d/>
+    <dgm:txPr/>
+    <dgm:style>
+      <a:lnRef idx="2">
+        <a:scrgbClr r="0" g="0" b="0"/>
+      </a:lnRef>
+      <a:fillRef idx="1">
+        <a:scrgbClr r="0" g="0" b="0"/>
+      </a:fillRef>
+      <a:effectRef idx="0">
+        <a:scrgbClr r="0" g="0" b="0"/>
+      </a:effectRef>
+      <a:fontRef idx="minor"/>
+    </dgm:style>
+  </dgm:styleLbl>
+  <dgm:styleLbl name="sibTrans2D1">
+    <dgm:scene3d>
+      <a:camera prst="orthographicFront"/>
+      <a:lightRig rig="threePt" dir="t"/>
+    </dgm:scene3d>
+    <dgm:sp3d/>
+    <dgm:txPr/>
+    <dgm:style>
+      <a:lnRef idx="0">
+        <a:scrgbClr r="0" g="0" b="0"/>
+      </a:lnRef>
+      <a:fillRef idx="1">
+        <a:scrgbClr r="0" g="0" b="0"/>
+      </a:fillRef>
+      <a:effectRef idx="0">
+        <a:scrgbClr r="0" g="0" b="0"/>
+      </a:effectRef>
+      <a:fontRef idx="minor">
+        <a:schemeClr val="lt1"/>
+      </a:fontRef>
+    </dgm:style>
+  </dgm:styleLbl>
+  <dgm:styleLbl name="fgSibTrans2D1">
+    <dgm:scene3d>
+      <a:camera prst="orthographicFront"/>
+      <a:lightRig rig="threePt" dir="t"/>
+    </dgm:scene3d>
+    <dgm:sp3d/>
+    <dgm:txPr/>
+    <dgm:style>
+      <a:lnRef idx="0">
+        <a:scrgbClr r="0" g="0" b="0"/>
+      </a:lnRef>
+      <a:fillRef idx="1">
+        <a:scrgbClr r="0" g="0" b="0"/>
+      </a:fillRef>
+      <a:effectRef idx="0">
+        <a:scrgbClr r="0" g="0" b="0"/>
+      </a:effectRef>
+      <a:fontRef idx="minor">
+        <a:schemeClr val="lt1"/>
+      </a:fontRef>
+    </dgm:style>
+  </dgm:styleLbl>
+  <dgm:styleLbl name="bgSibTrans2D1">
+    <dgm:scene3d>
+      <a:camera prst="orthographicFront"/>
+      <a:lightRig rig="threePt" dir="t"/>
+    </dgm:scene3d>
+    <dgm:sp3d/>
+    <dgm:txPr/>
+    <dgm:style>
+      <a:lnRef idx="0">
+        <a:scrgbClr r="0" g="0" b="0"/>
+      </a:lnRef>
+      <a:fillRef idx="1">
+        <a:scrgbClr r="0" g="0" b="0"/>
+      </a:fillRef>
+      <a:effectRef idx="0">
+        <a:scrgbClr r="0" g="0" b="0"/>
+      </a:effectRef>
+      <a:fontRef idx="minor">
+        <a:schemeClr val="lt1"/>
+      </a:fontRef>
+    </dgm:style>
+  </dgm:styleLbl>
+  <dgm:styleLbl name="sibTrans1D1">
+    <dgm:scene3d>
+      <a:camera prst="orthographicFront"/>
+      <a:lightRig rig="threePt" dir="t"/>
+    </dgm:scene3d>
+    <dgm:sp3d/>
+    <dgm:txPr/>
+    <dgm:style>
+      <a:lnRef idx="1">
+        <a:scrgbClr r="0" g="0" b="0"/>
+      </a:lnRef>
+      <a:fillRef idx="0">
+        <a:scrgbClr r="0" g="0" b="0"/>
+      </a:fillRef>
+      <a:effectRef idx="0">
+        <a:scrgbClr r="0" g="0" b="0"/>
+      </a:effectRef>
+      <a:fontRef idx="minor"/>
+    </dgm:style>
+  </dgm:styleLbl>
+  <dgm:styleLbl name="callout">
+    <dgm:scene3d>
+      <a:camera prst="orthographicFront"/>
+      <a:lightRig rig="threePt" dir="t"/>
+    </dgm:scene3d>
+    <dgm:sp3d/>
+    <dgm:txPr/>
+    <dgm:style>
+      <a:lnRef idx="2">
+        <a:scrgbClr r="0" g="0" b="0"/>
+      </a:lnRef>
+      <a:fillRef idx="1">
+        <a:scrgbClr r="0" g="0" b="0"/>
+      </a:fillRef>
+      <a:effectRef idx="0">
+        <a:scrgbClr r="0" g="0" b="0"/>
+      </a:effectRef>
+      <a:fontRef idx="minor"/>
+    </dgm:style>
+  </dgm:styleLbl>
+  <dgm:styleLbl name="asst0">
+    <dgm:scene3d>
+      <a:camera prst="orthographicFront"/>
+      <a:lightRig rig="threePt" dir="t"/>
+    </dgm:scene3d>
+    <dgm:sp3d/>
+    <dgm:txPr/>
+    <dgm:style>
+      <a:lnRef idx="2">
+        <a:scrgbClr r="0" g="0" b="0"/>
+      </a:lnRef>
+      <a:fillRef idx="1">
+        <a:scrgbClr r="0" g="0" b="0"/>
+      </a:fillRef>
+      <a:effectRef idx="0">
+        <a:scrgbClr r="0" g="0" b="0"/>
+      </a:effectRef>
+      <a:fontRef idx="minor">
+        <a:schemeClr val="lt1"/>
+      </a:fontRef>
+    </dgm:style>
+  </dgm:styleLbl>
+  <dgm:styleLbl name="asst1">
+    <dgm:scene3d>
+      <a:camera prst="orthographicFront"/>
+      <a:lightRig rig="threePt" dir="t"/>
+    </dgm:scene3d>
+    <dgm:sp3d/>
+    <dgm:txPr/>
+    <dgm:style>
+      <a:lnRef idx="2">
+        <a:scrgbClr r="0" g="0" b="0"/>
+      </a:lnRef>
+      <a:fillRef idx="1">
+        <a:scrgbClr r="0" g="0" b="0"/>
+      </a:fillRef>
+      <a:effectRef idx="0">
+        <a:scrgbClr r="0" g="0" b="0"/>
+      </a:effectRef>
+      <a:fontRef idx="minor">
+        <a:schemeClr val="lt1"/>
+      </a:fontRef>
+    </dgm:style>
+  </dgm:styleLbl>
+  <dgm:styleLbl name="asst2">
+    <dgm:scene3d>
+      <a:camera prst="orthographicFront"/>
+      <a:lightRig rig="threePt" dir="t"/>
+    </dgm:scene3d>
+    <dgm:sp3d/>
+    <dgm:txPr/>
+    <dgm:style>
+      <a:lnRef idx="2">
+        <a:scrgbClr r="0" g="0" b="0"/>
+      </a:lnRef>
+      <a:fillRef idx="1">
+        <a:scrgbClr r="0" g="0" b="0"/>
+      </a:fillRef>
+      <a:effectRef idx="0">
+        <a:scrgbClr r="0" g="0" b="0"/>
+      </a:effectRef>
+      <a:fontRef idx="minor">
+        <a:schemeClr val="lt1"/>
+      </a:fontRef>
+    </dgm:style>
+  </dgm:styleLbl>
+  <dgm:styleLbl name="asst3">
+    <dgm:scene3d>
+      <a:camera prst="orthographicFront"/>
+      <a:lightRig rig="threePt" dir="t"/>
+    </dgm:scene3d>
+    <dgm:sp3d/>
+    <dgm:txPr/>
+    <dgm:style>
+      <a:lnRef idx="2">
+        <a:scrgbClr r="0" g="0" b="0"/>
+      </a:lnRef>
+      <a:fillRef idx="1">
+        <a:scrgbClr r="0" g="0" b="0"/>
+      </a:fillRef>
+      <a:effectRef idx="0">
+        <a:scrgbClr r="0" g="0" b="0"/>
+      </a:effectRef>
+      <a:fontRef idx="minor">
+        <a:schemeClr val="lt1"/>
+      </a:fontRef>
+    </dgm:style>
+  </dgm:styleLbl>
+  <dgm:styleLbl name="asst4">
+    <dgm:scene3d>
+      <a:camera prst="orthographicFront"/>
+      <a:lightRig rig="threePt" dir="t"/>
+    </dgm:scene3d>
+    <dgm:sp3d/>
+    <dgm:txPr/>
+    <dgm:style>
+      <a:lnRef idx="2">
+        <a:scrgbClr r="0" g="0" b="0"/>
+      </a:lnRef>
+      <a:fillRef idx="1">
+        <a:scrgbClr r="0" g="0" b="0"/>
+      </a:fillRef>
+      <a:effectRef idx="0">
+        <a:scrgbClr r="0" g="0" b="0"/>
+      </a:effectRef>
+      <a:fontRef idx="minor">
+        <a:schemeClr val="lt1"/>
+      </a:fontRef>
+    </dgm:style>
+  </dgm:styleLbl>
+  <dgm:styleLbl name="parChTrans2D1">
+    <dgm:scene3d>
+      <a:camera prst="orthographicFront"/>
+      <a:lightRig rig="threePt" dir="t"/>
+    </dgm:scene3d>
+    <dgm:sp3d/>
+    <dgm:txPr/>
+    <dgm:style>
+      <a:lnRef idx="2">
+        <a:scrgbClr r="0" g="0" b="0"/>
+      </a:lnRef>
+      <a:fillRef idx="1">
+        <a:scrgbClr r="0" g="0" b="0"/>
+      </a:fillRef>
+      <a:effectRef idx="0">
+        <a:scrgbClr r="0" g="0" b="0"/>
+      </a:effectRef>
+      <a:fontRef idx="minor">
+        <a:schemeClr val="lt1"/>
+      </a:fontRef>
+    </dgm:style>
+  </dgm:styleLbl>
+  <dgm:styleLbl name="parChTrans2D2">
+    <dgm:scene3d>
+      <a:camera prst="orthographicFront"/>
+      <a:lightRig rig="threePt" dir="t"/>
+    </dgm:scene3d>
+    <dgm:sp3d/>
+    <dgm:txPr/>
+    <dgm:style>
+      <a:lnRef idx="2">
+        <a:scrgbClr r="0" g="0" b="0"/>
+      </a:lnRef>
+      <a:fillRef idx="1">
+        <a:scrgbClr r="0" g="0" b="0"/>
+      </a:fillRef>
+      <a:effectRef idx="0">
+        <a:scrgbClr r="0" g="0" b="0"/>
+      </a:effectRef>
+      <a:fontRef idx="minor">
+        <a:schemeClr val="lt1"/>
+      </a:fontRef>
+    </dgm:style>
+  </dgm:styleLbl>
+  <dgm:styleLbl name="parChTrans2D3">
+    <dgm:scene3d>
+      <a:camera prst="orthographicFront"/>
+      <a:lightRig rig="threePt" dir="t"/>
+    </dgm:scene3d>
+    <dgm:sp3d/>
+    <dgm:txPr/>
+    <dgm:style>
+      <a:lnRef idx="2">
+        <a:scrgbClr r="0" g="0" b="0"/>
+      </a:lnRef>
+      <a:fillRef idx="1">
+        <a:scrgbClr r="0" g="0" b="0"/>
+      </a:fillRef>
+      <a:effectRef idx="0">
+        <a:scrgbClr r="0" g="0" b="0"/>
+      </a:effectRef>
+      <a:fontRef idx="minor">
+        <a:schemeClr val="lt1"/>
+      </a:fontRef>
+    </dgm:style>
+  </dgm:styleLbl>
+  <dgm:styleLbl name="parChTrans2D4">
+    <dgm:scene3d>
+      <a:camera prst="orthographicFront"/>
+      <a:lightRig rig="threePt" dir="t"/>
+    </dgm:scene3d>
+    <dgm:sp3d/>
+    <dgm:txPr/>
+    <dgm:style>
+      <a:lnRef idx="2">
+        <a:scrgbClr r="0" g="0" b="0"/>
+      </a:lnRef>
+      <a:fillRef idx="1">
+        <a:scrgbClr r="0" g="0" b="0"/>
+      </a:fillRef>
+      <a:effectRef idx="0">
+        <a:scrgbClr r="0" g="0" b="0"/>
+      </a:effectRef>
+      <a:fontRef idx="minor">
+        <a:schemeClr val="lt1"/>
+      </a:fontRef>
+    </dgm:style>
+  </dgm:styleLbl>
+  <dgm:styleLbl name="parChTrans1D1">
+    <dgm:scene3d>
+      <a:camera prst="orthographicFront"/>
+      <a:lightRig rig="threePt" dir="t"/>
+    </dgm:scene3d>
+    <dgm:sp3d/>
+    <dgm:txPr/>
+    <dgm:style>
+      <a:lnRef idx="2">
+        <a:scrgbClr r="0" g="0" b="0"/>
+      </a:lnRef>
+      <a:fillRef idx="0">
+        <a:scrgbClr r="0" g="0" b="0"/>
+      </a:fillRef>
+      <a:effectRef idx="0">
+        <a:scrgbClr r="0" g="0" b="0"/>
+      </a:effectRef>
+      <a:fontRef idx="minor"/>
+    </dgm:style>
+  </dgm:styleLbl>
+  <dgm:styleLbl name="parChTrans1D2">
+    <dgm:scene3d>
+      <a:camera prst="orthographicFront"/>
+      <a:lightRig rig="threePt" dir="t"/>
+    </dgm:scene3d>
+    <dgm:sp3d/>
+    <dgm:txPr/>
+    <dgm:style>
+      <a:lnRef idx="2">
+        <a:scrgbClr r="0" g="0" b="0"/>
+      </a:lnRef>
+      <a:fillRef idx="0">
+        <a:scrgbClr r="0" g="0" b="0"/>
+      </a:fillRef>
+      <a:effectRef idx="0">
+        <a:scrgbClr r="0" g="0" b="0"/>
+      </a:effectRef>
+      <a:fontRef idx="minor"/>
+    </dgm:style>
+  </dgm:styleLbl>
+  <dgm:styleLbl name="parChTrans1D3">
+    <dgm:scene3d>
+      <a:camera prst="orthographicFront"/>
+      <a:lightRig rig="threePt" dir="t"/>
+    </dgm:scene3d>
+    <dgm:sp3d/>
+    <dgm:txPr/>
+    <dgm:style>
+      <a:lnRef idx="2">
+        <a:scrgbClr r="0" g="0" b="0"/>
+      </a:lnRef>
+      <a:fillRef idx="0">
+        <a:scrgbClr r="0" g="0" b="0"/>
+      </a:fillRef>
+      <a:effectRef idx="0">
+        <a:scrgbClr r="0" g="0" b="0"/>
+      </a:effectRef>
+      <a:fontRef idx="minor"/>
+    </dgm:style>
+  </dgm:styleLbl>
+  <dgm:styleLbl name="parChTrans1D4">
+    <dgm:scene3d>
+      <a:camera prst="orthographicFront"/>
+      <a:lightRig rig="threePt" dir="t"/>
+    </dgm:scene3d>
+    <dgm:sp3d/>
+    <dgm:txPr/>
+    <dgm:style>
+      <a:lnRef idx="2">
+        <a:scrgbClr r="0" g="0" b="0"/>
+      </a:lnRef>
+      <a:fillRef idx="0">
+        <a:scrgbClr r="0" g="0" b="0"/>
+      </a:fillRef>
+      <a:effectRef idx="0">
+        <a:scrgbClr r="0" g="0" b="0"/>
+      </a:effectRef>
+      <a:fontRef idx="minor"/>
+    </dgm:style>
+  </dgm:styleLbl>
+  <dgm:styleLbl name="fgAcc1">
+    <dgm:scene3d>
+      <a:camera prst="orthographicFront"/>
+      <a:lightRig rig="threePt" dir="t"/>
+    </dgm:scene3d>
+    <dgm:sp3d/>
+    <dgm:txPr/>
+    <dgm:style>
+      <a:lnRef idx="2">
+        <a:scrgbClr r="0" g="0" b="0"/>
+      </a:lnRef>
+      <a:fillRef idx="1">
+        <a:scrgbClr r="0" g="0" b="0"/>
+      </a:fillRef>
+      <a:effectRef idx="0">
+        <a:scrgbClr r="0" g="0" b="0"/>
+      </a:effectRef>
+      <a:fontRef idx="minor"/>
+    </dgm:style>
+  </dgm:styleLbl>
+  <dgm:styleLbl name="conFgAcc1">
+    <dgm:scene3d>
+      <a:camera prst="orthographicFront"/>
+      <a:lightRig rig="threePt" dir="t"/>
+    </dgm:scene3d>
+    <dgm:sp3d/>
+    <dgm:txPr/>
+    <dgm:style>
+      <a:lnRef idx="2">
+        <a:scrgbClr r="0" g="0" b="0"/>
+      </a:lnRef>
+      <a:fillRef idx="1">
+        <a:scrgbClr r="0" g="0" b="0"/>
+      </a:fillRef>
+      <a:effectRef idx="0">
+        <a:scrgbClr r="0" g="0" b="0"/>
+      </a:effectRef>
+      <a:fontRef idx="minor"/>
+    </dgm:style>
+  </dgm:styleLbl>
+  <dgm:styleLbl name="alignAcc1">
+    <dgm:scene3d>
+      <a:camera prst="orthographicFront"/>
+      <a:lightRig rig="threePt" dir="t"/>
+    </dgm:scene3d>
+    <dgm:sp3d/>
+    <dgm:txPr/>
+    <dgm:style>
+      <a:lnRef idx="2">
+        <a:scrgbClr r="0" g="0" b="0"/>
+      </a:lnRef>
+      <a:fillRef idx="1">
+        <a:scrgbClr r="0" g="0" b="0"/>
+      </a:fillRef>
+      <a:effectRef idx="0">
+        <a:scrgbClr r="0" g="0" b="0"/>
+      </a:effectRef>
+      <a:fontRef idx="minor"/>
+    </dgm:style>
+  </dgm:styleLbl>
+  <dgm:styleLbl name="trAlignAcc1">
+    <dgm:scene3d>
+      <a:camera prst="orthographicFront"/>
+      <a:lightRig rig="threePt" dir="t"/>
+    </dgm:scene3d>
+    <dgm:sp3d/>
+    <dgm:txPr/>
+    <dgm:style>
+      <a:lnRef idx="1">
+        <a:scrgbClr r="0" g="0" b="0"/>
+      </a:lnRef>
+      <a:fillRef idx="1">
+        <a:scrgbClr r="0" g="0" b="0"/>
+      </a:fillRef>
+      <a:effectRef idx="0">
+        <a:scrgbClr r="0" g="0" b="0"/>
+      </a:effectRef>
+      <a:fontRef idx="minor"/>
+    </dgm:style>
+  </dgm:styleLbl>
+  <dgm:styleLbl name="bgAcc1">
+    <dgm:scene3d>
+      <a:camera prst="orthographicFront"/>
+      <a:lightRig rig="threePt" dir="t"/>
+    </dgm:scene3d>
+    <dgm:sp3d/>
+    <dgm:txPr/>
+    <dgm:style>
+      <a:lnRef idx="2">
+        <a:scrgbClr r="0" g="0" b="0"/>
+      </a:lnRef>
+      <a:fillRef idx="1">
+        <a:scrgbClr r="0" g="0" b="0"/>
+      </a:fillRef>
+      <a:effectRef idx="0">
+        <a:scrgbClr r="0" g="0" b="0"/>
+      </a:effectRef>
+      <a:fontRef idx="minor"/>
+    </dgm:style>
+  </dgm:styleLbl>
+  <dgm:styleLbl name="solidFgAcc1">
+    <dgm:scene3d>
+      <a:camera prst="orthographicFront"/>
+      <a:lightRig rig="threePt" dir="t"/>
+    </dgm:scene3d>
+    <dgm:sp3d/>
+    <dgm:txPr/>
+    <dgm:style>
+      <a:lnRef idx="2">
+        <a:scrgbClr r="0" g="0" b="0"/>
+      </a:lnRef>
+      <a:fillRef idx="1">
+        <a:scrgbClr r="0" g="0" b="0"/>
+      </a:fillRef>
+      <a:effectRef idx="0">
+        <a:scrgbClr r="0" g="0" b="0"/>
+      </a:effectRef>
+      <a:fontRef idx="minor"/>
+    </dgm:style>
+  </dgm:styleLbl>
+  <dgm:styleLbl name="solidAlignAcc1">
+    <dgm:scene3d>
+      <a:camera prst="orthographicFront"/>
+      <a:lightRig rig="threePt" dir="t"/>
+    </dgm:scene3d>
+    <dgm:sp3d/>
+    <dgm:txPr/>
+    <dgm:style>
+      <a:lnRef idx="2">
+        <a:scrgbClr r="0" g="0" b="0"/>
+      </a:lnRef>
+      <a:fillRef idx="1">
+        <a:scrgbClr r="0" g="0" b="0"/>
+      </a:fillRef>
+      <a:effectRef idx="0">
+        <a:scrgbClr r="0" g="0" b="0"/>
+      </a:effectRef>
+      <a:fontRef idx="minor"/>
+    </dgm:style>
+  </dgm:styleLbl>
+  <dgm:styleLbl name="solidBgAcc1">
+    <dgm:scene3d>
+      <a:camera prst="orthographicFront"/>
+      <a:lightRig rig="threePt" dir="t"/>
+    </dgm:scene3d>
+    <dgm:sp3d/>
+    <dgm:txPr/>
+    <dgm:style>
+      <a:lnRef idx="2">
+        <a:scrgbClr r="0" g="0" b="0"/>
+      </a:lnRef>
+      <a:fillRef idx="1">
+        <a:scrgbClr r="0" g="0" b="0"/>
+      </a:fillRef>
+      <a:effectRef idx="0">
+        <a:scrgbClr r="0" g="0" b="0"/>
+      </a:effectRef>
+      <a:fontRef idx="minor"/>
+    </dgm:style>
+  </dgm:styleLbl>
+  <dgm:styleLbl name="fgAccFollowNode1">
+    <dgm:scene3d>
+      <a:camera prst="orthographicFront"/>
+      <a:lightRig rig="threePt" dir="t"/>
+    </dgm:scene3d>
+    <dgm:sp3d/>
+    <dgm:txPr/>
+    <dgm:style>
+      <a:lnRef idx="2">
+        <a:scrgbClr r="0" g="0" b="0"/>
+      </a:lnRef>
+      <a:fillRef idx="1">
+        <a:scrgbClr r="0" g="0" b="0"/>
+      </a:fillRef>
+      <a:effectRef idx="0">
+        <a:scrgbClr r="0" g="0" b="0"/>
+      </a:effectRef>
+      <a:fontRef idx="minor"/>
+    </dgm:style>
+  </dgm:styleLbl>
+  <dgm:styleLbl name="alignAccFollowNode1">
+    <dgm:scene3d>
+      <a:camera prst="orthographicFront"/>
+      <a:lightRig rig="threePt" dir="t"/>
+    </dgm:scene3d>
+    <dgm:sp3d/>
+    <dgm:txPr/>
+    <dgm:style>
+      <a:lnRef idx="2">
+        <a:scrgbClr r="0" g="0" b="0"/>
+      </a:lnRef>
+      <a:fillRef idx="1">
+        <a:scrgbClr r="0" g="0" b="0"/>
+      </a:fillRef>
+      <a:effectRef idx="0">
+        <a:scrgbClr r="0" g="0" b="0"/>
+      </a:effectRef>
+      <a:fontRef idx="minor"/>
+    </dgm:style>
+  </dgm:styleLbl>
+  <dgm:styleLbl name="bgAccFollowNode1">
+    <dgm:scene3d>
+      <a:camera prst="orthographicFront"/>
+      <a:lightRig rig="threePt" dir="t"/>
+    </dgm:scene3d>
+    <dgm:sp3d/>
+    <dgm:txPr/>
+    <dgm:style>
+      <a:lnRef idx="2">
+        <a:scrgbClr r="0" g="0" b="0"/>
+      </a:lnRef>
+      <a:fillRef idx="1">
+        <a:scrgbClr r="0" g="0" b="0"/>
+      </a:fillRef>
+      <a:effectRef idx="0">
+        <a:scrgbClr r="0" g="0" b="0"/>
+      </a:effectRef>
+      <a:fontRef idx="minor"/>
+    </dgm:style>
+  </dgm:styleLbl>
+  <dgm:styleLbl name="fgAcc0">
+    <dgm:scene3d>
+      <a:camera prst="orthographicFront"/>
+      <a:lightRig rig="threePt" dir="t"/>
+    </dgm:scene3d>
+    <dgm:sp3d/>
+    <dgm:txPr/>
+    <dgm:style>
+      <a:lnRef idx="2">
+        <a:scrgbClr r="0" g="0" b="0"/>
+      </a:lnRef>
+      <a:fillRef idx="1">
+        <a:scrgbClr r="0" g="0" b="0"/>
+      </a:fillRef>
+      <a:effectRef idx="0">
+        <a:scrgbClr r="0" g="0" b="0"/>
+      </a:effectRef>
+      <a:fontRef idx="minor"/>
+    </dgm:style>
+  </dgm:styleLbl>
+  <dgm:styleLbl name="fgAcc2">
+    <dgm:scene3d>
+      <a:camera prst="orthographicFront"/>
+      <a:lightRig rig="threePt" dir="t"/>
+    </dgm:scene3d>
+    <dgm:sp3d/>
+    <dgm:txPr/>
+    <dgm:style>
+      <a:lnRef idx="2">
+        <a:scrgbClr r="0" g="0" b="0"/>
+      </a:lnRef>
+      <a:fillRef idx="1">
+        <a:scrgbClr r="0" g="0" b="0"/>
+      </a:fillRef>
+      <a:effectRef idx="0">
+        <a:scrgbClr r="0" g="0" b="0"/>
+      </a:effectRef>
+      <a:fontRef idx="minor"/>
+    </dgm:style>
+  </dgm:styleLbl>
+  <dgm:styleLbl name="fgAcc3">
+    <dgm:scene3d>
+      <a:camera prst="orthographicFront"/>
+      <a:lightRig rig="threePt" dir="t"/>
+    </dgm:scene3d>
+    <dgm:sp3d/>
+    <dgm:txPr/>
+    <dgm:style>
+      <a:lnRef idx="2">
+        <a:scrgbClr r="0" g="0" b="0"/>
+      </a:lnRef>
+      <a:fillRef idx="1">
+        <a:scrgbClr r="0" g="0" b="0"/>
+      </a:fillRef>
+      <a:effectRef idx="0">
+        <a:scrgbClr r="0" g="0" b="0"/>
+      </a:effectRef>
+      <a:fontRef idx="minor"/>
+    </dgm:style>
+  </dgm:styleLbl>
+  <dgm:styleLbl name="fgAcc4">
+    <dgm:scene3d>
+      <a:camera prst="orthographicFront"/>
+      <a:lightRig rig="threePt" dir="t"/>
+    </dgm:scene3d>
+    <dgm:sp3d/>
+    <dgm:txPr/>
+    <dgm:style>
+      <a:lnRef idx="2">
+        <a:scrgbClr r="0" g="0" b="0"/>
+      </a:lnRef>
+      <a:fillRef idx="1">
+        <a:scrgbClr r="0" g="0" b="0"/>
+      </a:fillRef>
+      <a:effectRef idx="0">
+        <a:scrgbClr r="0" g="0" b="0"/>
+      </a:effectRef>
+      <a:fontRef idx="minor"/>
+    </dgm:style>
+  </dgm:styleLbl>
+  <dgm:styleLbl name="bgShp">
+    <dgm:scene3d>
+      <a:camera prst="orthographicFront"/>
+      <a:lightRig rig="threePt" dir="t"/>
+    </dgm:scene3d>
+    <dgm:sp3d/>
+    <dgm:txPr/>
+    <dgm:style>
+      <a:lnRef idx="0">
+        <a:scrgbClr r="0" g="0" b="0"/>
+      </a:lnRef>
+      <a:fillRef idx="1">
+        <a:scrgbClr r="0" g="0" b="0"/>
+      </a:fillRef>
+      <a:effectRef idx="0">
+        <a:scrgbClr r="0" g="0" b="0"/>
+      </a:effectRef>
+      <a:fontRef idx="minor"/>
+    </dgm:style>
+  </dgm:styleLbl>
+  <dgm:styleLbl name="dkBgShp">
+    <dgm:scene3d>
+      <a:camera prst="orthographicFront"/>
+      <a:lightRig rig="threePt" dir="t"/>
+    </dgm:scene3d>
+    <dgm:sp3d/>
+    <dgm:txPr/>
+    <dgm:style>
+      <a:lnRef idx="0">
+        <a:scrgbClr r="0" g="0" b="0"/>
+      </a:lnRef>
+      <a:fillRef idx="1">
+        <a:scrgbClr r="0" g="0" b="0"/>
+      </a:fillRef>
+      <a:effectRef idx="0">
+        <a:scrgbClr r="0" g="0" b="0"/>
+      </a:effectRef>
+      <a:fontRef idx="minor"/>
+    </dgm:style>
+  </dgm:styleLbl>
+  <dgm:styleLbl name="trBgShp">
+    <dgm:scene3d>
+      <a:camera prst="orthographicFront"/>
+      <a:lightRig rig="threePt" dir="t"/>
+    </dgm:scene3d>
+    <dgm:sp3d/>
+    <dgm:txPr/>
+    <dgm:style>
+      <a:lnRef idx="0">
+        <a:scrgbClr r="0" g="0" b="0"/>
+      </a:lnRef>
+      <a:fillRef idx="1">
+        <a:scrgbClr r="0" g="0" b="0"/>
+      </a:fillRef>
+      <a:effectRef idx="0">
+        <a:scrgbClr r="0" g="0" b="0"/>
+      </a:effectRef>
+      <a:fontRef idx="minor"/>
+    </dgm:style>
+  </dgm:styleLbl>
+  <dgm:styleLbl name="fgShp">
+    <dgm:scene3d>
+      <a:camera prst="orthographicFront"/>
+      <a:lightRig rig="threePt" dir="t"/>
+    </dgm:scene3d>
+    <dgm:sp3d/>
+    <dgm:txPr/>
+    <dgm:style>
+      <a:lnRef idx="2">
+        <a:scrgbClr r="0" g="0" b="0"/>
+      </a:lnRef>
+      <a:fillRef idx="1">
+        <a:scrgbClr r="0" g="0" b="0"/>
+      </a:fillRef>
+      <a:effectRef idx="0">
+        <a:scrgbClr r="0" g="0" b="0"/>
+      </a:effectRef>
+      <a:fontRef idx="minor"/>
+    </dgm:style>
+  </dgm:styleLbl>
+  <dgm:styleLbl name="revTx">
+    <dgm:scene3d>
+      <a:camera prst="orthographicFront"/>
+      <a:lightRig rig="threePt" dir="t"/>
+    </dgm:scene3d>
+    <dgm:sp3d/>
+    <dgm:txPr/>
+    <dgm:style>
+      <a:lnRef idx="0">
+        <a:scrgbClr r="0" g="0" b="0"/>
+      </a:lnRef>
+      <a:fillRef idx="0">
+        <a:scrgbClr r="0" g="0" b="0"/>
+      </a:fillRef>
+      <a:effectRef idx="0">
+        <a:scrgbClr r="0" g="0" b="0"/>
+      </a:effectRef>
+      <a:fontRef idx="minor"/>
+    </dgm:style>
+  </dgm:styleLbl>
+</dgm:styleDef>
 </file>
 
 <file path=ppt/slideLayouts/slideLayout1.xml><?xml version="1.0" encoding="utf-8"?>
@@ -3409,7 +6134,7 @@
           <a:p>
             <a:r>
               <a:rPr lang="en-US" altLang="ko-KR" dirty="0"/>
-              <a:t>v0.0.1</a:t>
+              <a:t>v0.0.2</a:t>
             </a:r>
           </a:p>
           <a:p>
@@ -3435,6 +6160,97 @@
 </file>
 
 <file path=ppt/slides/slide2.xml><?xml version="1.0" encoding="utf-8"?>
+<p:sld xmlns:a="http://schemas.openxmlformats.org/drawingml/2006/main" xmlns:r="http://schemas.openxmlformats.org/officeDocument/2006/relationships" xmlns:p="http://schemas.openxmlformats.org/presentationml/2006/main">
+  <p:cSld>
+    <p:spTree>
+      <p:nvGrpSpPr>
+        <p:cNvPr id="1" name=""/>
+        <p:cNvGrpSpPr/>
+        <p:nvPr/>
+      </p:nvGrpSpPr>
+      <p:grpSpPr>
+        <a:xfrm>
+          <a:off x="0" y="0"/>
+          <a:ext cx="0" cy="0"/>
+          <a:chOff x="0" y="0"/>
+          <a:chExt cx="0" cy="0"/>
+        </a:xfrm>
+      </p:grpSpPr>
+      <p:sp>
+        <p:nvSpPr>
+          <p:cNvPr id="2" name="제목 1">
+            <a:extLst>
+              <a:ext uri="{FF2B5EF4-FFF2-40B4-BE49-F238E27FC236}">
+                <a16:creationId xmlns:a16="http://schemas.microsoft.com/office/drawing/2014/main" id="{01067273-93BF-8FC2-C1F1-1B8D1E7857A9}"/>
+              </a:ext>
+            </a:extLst>
+          </p:cNvPr>
+          <p:cNvSpPr>
+            <a:spLocks noGrp="1"/>
+          </p:cNvSpPr>
+          <p:nvPr>
+            <p:ph type="title"/>
+          </p:nvPr>
+        </p:nvSpPr>
+        <p:spPr>
+          <a:xfrm>
+            <a:off x="0" y="0"/>
+            <a:ext cx="4081806" cy="791852"/>
+          </a:xfrm>
+        </p:spPr>
+        <p:txBody>
+          <a:bodyPr/>
+          <a:lstStyle/>
+          <a:p>
+            <a:r>
+              <a:rPr lang="ko-KR" altLang="en-US" dirty="0"/>
+              <a:t>전체 개발 순서</a:t>
+            </a:r>
+          </a:p>
+        </p:txBody>
+      </p:sp>
+      <p:graphicFrame>
+        <p:nvGraphicFramePr>
+          <p:cNvPr id="4" name="다이어그램 3">
+            <a:extLst>
+              <a:ext uri="{FF2B5EF4-FFF2-40B4-BE49-F238E27FC236}">
+                <a16:creationId xmlns:a16="http://schemas.microsoft.com/office/drawing/2014/main" id="{0EE4E555-6A97-2854-D082-054BF5B979FB}"/>
+              </a:ext>
+            </a:extLst>
+          </p:cNvPr>
+          <p:cNvGraphicFramePr/>
+          <p:nvPr>
+            <p:extLst>
+              <p:ext uri="{D42A27DB-BD31-4B8C-83A1-F6EECF244321}">
+                <p14:modId xmlns:p14="http://schemas.microsoft.com/office/powerpoint/2010/main" val="4246131215"/>
+              </p:ext>
+            </p:extLst>
+          </p:nvPr>
+        </p:nvGraphicFramePr>
+        <p:xfrm>
+          <a:off x="1135406" y="1178351"/>
+          <a:ext cx="9921188" cy="2815384"/>
+        </p:xfrm>
+        <a:graphic>
+          <a:graphicData uri="http://schemas.openxmlformats.org/drawingml/2006/diagram">
+            <dgm:relIds xmlns:dgm="http://schemas.openxmlformats.org/drawingml/2006/diagram" xmlns:r="http://schemas.openxmlformats.org/officeDocument/2006/relationships" r:dm="rId2" r:lo="rId3" r:qs="rId4" r:cs="rId5"/>
+          </a:graphicData>
+        </a:graphic>
+      </p:graphicFrame>
+    </p:spTree>
+    <p:extLst>
+      <p:ext uri="{BB962C8B-B14F-4D97-AF65-F5344CB8AC3E}">
+        <p14:creationId xmlns:p14="http://schemas.microsoft.com/office/powerpoint/2010/main" val="61532937"/>
+      </p:ext>
+    </p:extLst>
+  </p:cSld>
+  <p:clrMapOvr>
+    <a:masterClrMapping/>
+  </p:clrMapOvr>
+</p:sld>
+</file>
+
+<file path=ppt/slides/slide3.xml><?xml version="1.0" encoding="utf-8"?>
 <p:sld xmlns:a="http://schemas.openxmlformats.org/drawingml/2006/main" xmlns:r="http://schemas.openxmlformats.org/officeDocument/2006/relationships" xmlns:p="http://schemas.openxmlformats.org/presentationml/2006/main">
   <p:cSld>
     <p:spTree>

</xml_diff>

<commit_message>
RFP 시스템 구성도 v0.2.2 [2023-01-28 20:39]
</commit_message>
<xml_diff>
--- a/Documents/Requirements/service_order_client/raw/학과 커뮤니티 웹사이트 및 모바일 앱 개발 시스템 구성도.pptx
+++ b/Documents/Requirements/service_order_client/raw/학과 커뮤니티 웹사이트 및 모바일 앱 개발 시스템 구성도.pptx
@@ -4,6 +4,9 @@
   <p:sldMasterIdLst>
     <p:sldMasterId id="2147483648" r:id="rId1"/>
   </p:sldMasterIdLst>
+  <p:notesMasterIdLst>
+    <p:notesMasterId r:id="rId6"/>
+  </p:notesMasterIdLst>
   <p:sldIdLst>
     <p:sldId id="256" r:id="rId2"/>
     <p:sldId id="258" r:id="rId3"/>
@@ -3214,7 +3217,7 @@
   <dgm:whole/>
   <dgm:extLst>
     <a:ext uri="http://schemas.microsoft.com/office/drawing/2008/diagram">
-      <dsp:dataModelExt xmlns:dsp="http://schemas.microsoft.com/office/drawing/2008/diagram" relId="rId6" minVer="http://schemas.openxmlformats.org/drawingml/2006/diagram"/>
+      <dsp:dataModelExt xmlns:dsp="http://schemas.microsoft.com/office/drawing/2008/diagram" relId="rId7" minVer="http://schemas.openxmlformats.org/drawingml/2006/diagram"/>
     </a:ext>
   </dgm:extLst>
 </dgm:dataModel>
@@ -3633,7 +3636,7 @@
   <dgm:whole/>
   <dgm:extLst>
     <a:ext uri="http://schemas.microsoft.com/office/drawing/2008/diagram">
-      <dsp:dataModelExt xmlns:dsp="http://schemas.microsoft.com/office/drawing/2008/diagram" relId="rId11" minVer="http://schemas.openxmlformats.org/drawingml/2006/diagram"/>
+      <dsp:dataModelExt xmlns:dsp="http://schemas.microsoft.com/office/drawing/2008/diagram" relId="rId12" minVer="http://schemas.openxmlformats.org/drawingml/2006/diagram"/>
     </a:ext>
   </dgm:extLst>
 </dgm:dataModel>
@@ -9179,6 +9182,439 @@
     </dgm:style>
   </dgm:styleLbl>
 </dgm:styleDef>
+</file>
+
+<file path=ppt/notesMasters/notesMaster1.xml><?xml version="1.0" encoding="utf-8"?>
+<p:notesMaster xmlns:a="http://schemas.openxmlformats.org/drawingml/2006/main" xmlns:r="http://schemas.openxmlformats.org/officeDocument/2006/relationships" xmlns:p="http://schemas.openxmlformats.org/presentationml/2006/main">
+  <p:cSld>
+    <p:bg>
+      <p:bgRef idx="1001">
+        <a:schemeClr val="bg1"/>
+      </p:bgRef>
+    </p:bg>
+    <p:spTree>
+      <p:nvGrpSpPr>
+        <p:cNvPr id="1" name=""/>
+        <p:cNvGrpSpPr/>
+        <p:nvPr/>
+      </p:nvGrpSpPr>
+      <p:grpSpPr>
+        <a:xfrm>
+          <a:off x="0" y="0"/>
+          <a:ext cx="0" cy="0"/>
+          <a:chOff x="0" y="0"/>
+          <a:chExt cx="0" cy="0"/>
+        </a:xfrm>
+      </p:grpSpPr>
+      <p:sp>
+        <p:nvSpPr>
+          <p:cNvPr id="2" name="머리글 개체 틀 1"/>
+          <p:cNvSpPr>
+            <a:spLocks noGrp="1"/>
+          </p:cNvSpPr>
+          <p:nvPr>
+            <p:ph type="hdr" sz="quarter"/>
+          </p:nvPr>
+        </p:nvSpPr>
+        <p:spPr>
+          <a:xfrm>
+            <a:off x="0" y="0"/>
+            <a:ext cx="2971800" cy="458788"/>
+          </a:xfrm>
+          <a:prstGeom prst="rect">
+            <a:avLst/>
+          </a:prstGeom>
+        </p:spPr>
+        <p:txBody>
+          <a:bodyPr vert="horz" lIns="91440" tIns="45720" rIns="91440" bIns="45720" rtlCol="0"/>
+          <a:lstStyle>
+            <a:lvl1pPr algn="l">
+              <a:defRPr sz="1200"/>
+            </a:lvl1pPr>
+          </a:lstStyle>
+          <a:p>
+            <a:endParaRPr lang="ko-KR" altLang="en-US"/>
+          </a:p>
+        </p:txBody>
+      </p:sp>
+      <p:sp>
+        <p:nvSpPr>
+          <p:cNvPr id="3" name="날짜 개체 틀 2"/>
+          <p:cNvSpPr>
+            <a:spLocks noGrp="1"/>
+          </p:cNvSpPr>
+          <p:nvPr>
+            <p:ph type="dt" idx="1"/>
+          </p:nvPr>
+        </p:nvSpPr>
+        <p:spPr>
+          <a:xfrm>
+            <a:off x="3884613" y="0"/>
+            <a:ext cx="2971800" cy="458788"/>
+          </a:xfrm>
+          <a:prstGeom prst="rect">
+            <a:avLst/>
+          </a:prstGeom>
+        </p:spPr>
+        <p:txBody>
+          <a:bodyPr vert="horz" lIns="91440" tIns="45720" rIns="91440" bIns="45720" rtlCol="0"/>
+          <a:lstStyle>
+            <a:lvl1pPr algn="r">
+              <a:defRPr sz="1200"/>
+            </a:lvl1pPr>
+          </a:lstStyle>
+          <a:p>
+            <a:fld id="{5FD11E5E-6B83-48CE-87F4-BDB1482CC128}" type="datetimeFigureOut">
+              <a:rPr lang="ko-KR" altLang="en-US" smtClean="0"/>
+              <a:t>2023-01-28</a:t>
+            </a:fld>
+            <a:endParaRPr lang="ko-KR" altLang="en-US"/>
+          </a:p>
+        </p:txBody>
+      </p:sp>
+      <p:sp>
+        <p:nvSpPr>
+          <p:cNvPr id="4" name="슬라이드 이미지 개체 틀 3"/>
+          <p:cNvSpPr>
+            <a:spLocks noGrp="1" noRot="1" noChangeAspect="1"/>
+          </p:cNvSpPr>
+          <p:nvPr>
+            <p:ph type="sldImg" idx="2"/>
+          </p:nvPr>
+        </p:nvSpPr>
+        <p:spPr>
+          <a:xfrm>
+            <a:off x="685800" y="1143000"/>
+            <a:ext cx="5486400" cy="3086100"/>
+          </a:xfrm>
+          <a:prstGeom prst="rect">
+            <a:avLst/>
+          </a:prstGeom>
+          <a:noFill/>
+          <a:ln w="12700">
+            <a:solidFill>
+              <a:prstClr val="black"/>
+            </a:solidFill>
+          </a:ln>
+        </p:spPr>
+        <p:txBody>
+          <a:bodyPr vert="horz" lIns="91440" tIns="45720" rIns="91440" bIns="45720" rtlCol="0" anchor="ctr"/>
+          <a:lstStyle/>
+          <a:p>
+            <a:endParaRPr lang="ko-KR" altLang="en-US"/>
+          </a:p>
+        </p:txBody>
+      </p:sp>
+      <p:sp>
+        <p:nvSpPr>
+          <p:cNvPr id="5" name="슬라이드 노트 개체 틀 4"/>
+          <p:cNvSpPr>
+            <a:spLocks noGrp="1"/>
+          </p:cNvSpPr>
+          <p:nvPr>
+            <p:ph type="body" sz="quarter" idx="3"/>
+          </p:nvPr>
+        </p:nvSpPr>
+        <p:spPr>
+          <a:xfrm>
+            <a:off x="685800" y="4400550"/>
+            <a:ext cx="5486400" cy="3600450"/>
+          </a:xfrm>
+          <a:prstGeom prst="rect">
+            <a:avLst/>
+          </a:prstGeom>
+        </p:spPr>
+        <p:txBody>
+          <a:bodyPr vert="horz" lIns="91440" tIns="45720" rIns="91440" bIns="45720" rtlCol="0"/>
+          <a:lstStyle/>
+          <a:p>
+            <a:pPr lvl="0"/>
+            <a:r>
+              <a:rPr lang="ko-KR" altLang="en-US"/>
+              <a:t>마스터 텍스트 스타일을 편집하려면 클릭</a:t>
+            </a:r>
+          </a:p>
+          <a:p>
+            <a:pPr lvl="1"/>
+            <a:r>
+              <a:rPr lang="ko-KR" altLang="en-US"/>
+              <a:t>두 번째 수준</a:t>
+            </a:r>
+          </a:p>
+          <a:p>
+            <a:pPr lvl="2"/>
+            <a:r>
+              <a:rPr lang="ko-KR" altLang="en-US"/>
+              <a:t>세 번째 수준</a:t>
+            </a:r>
+          </a:p>
+          <a:p>
+            <a:pPr lvl="3"/>
+            <a:r>
+              <a:rPr lang="ko-KR" altLang="en-US"/>
+              <a:t>네 번째 수준</a:t>
+            </a:r>
+          </a:p>
+          <a:p>
+            <a:pPr lvl="4"/>
+            <a:r>
+              <a:rPr lang="ko-KR" altLang="en-US"/>
+              <a:t>다섯 번째 수준</a:t>
+            </a:r>
+          </a:p>
+        </p:txBody>
+      </p:sp>
+      <p:sp>
+        <p:nvSpPr>
+          <p:cNvPr id="6" name="바닥글 개체 틀 5"/>
+          <p:cNvSpPr>
+            <a:spLocks noGrp="1"/>
+          </p:cNvSpPr>
+          <p:nvPr>
+            <p:ph type="ftr" sz="quarter" idx="4"/>
+          </p:nvPr>
+        </p:nvSpPr>
+        <p:spPr>
+          <a:xfrm>
+            <a:off x="0" y="8685213"/>
+            <a:ext cx="2971800" cy="458787"/>
+          </a:xfrm>
+          <a:prstGeom prst="rect">
+            <a:avLst/>
+          </a:prstGeom>
+        </p:spPr>
+        <p:txBody>
+          <a:bodyPr vert="horz" lIns="91440" tIns="45720" rIns="91440" bIns="45720" rtlCol="0" anchor="b"/>
+          <a:lstStyle>
+            <a:lvl1pPr algn="l">
+              <a:defRPr sz="1200"/>
+            </a:lvl1pPr>
+          </a:lstStyle>
+          <a:p>
+            <a:endParaRPr lang="ko-KR" altLang="en-US"/>
+          </a:p>
+        </p:txBody>
+      </p:sp>
+      <p:sp>
+        <p:nvSpPr>
+          <p:cNvPr id="7" name="슬라이드 번호 개체 틀 6"/>
+          <p:cNvSpPr>
+            <a:spLocks noGrp="1"/>
+          </p:cNvSpPr>
+          <p:nvPr>
+            <p:ph type="sldNum" sz="quarter" idx="5"/>
+          </p:nvPr>
+        </p:nvSpPr>
+        <p:spPr>
+          <a:xfrm>
+            <a:off x="3884613" y="8685213"/>
+            <a:ext cx="2971800" cy="458787"/>
+          </a:xfrm>
+          <a:prstGeom prst="rect">
+            <a:avLst/>
+          </a:prstGeom>
+        </p:spPr>
+        <p:txBody>
+          <a:bodyPr vert="horz" lIns="91440" tIns="45720" rIns="91440" bIns="45720" rtlCol="0" anchor="b"/>
+          <a:lstStyle>
+            <a:lvl1pPr algn="r">
+              <a:defRPr sz="1200"/>
+            </a:lvl1pPr>
+          </a:lstStyle>
+          <a:p>
+            <a:fld id="{2B8858E5-ABDF-43D0-83D1-28899ACC22C6}" type="slidenum">
+              <a:rPr lang="ko-KR" altLang="en-US" smtClean="0"/>
+              <a:t>‹#›</a:t>
+            </a:fld>
+            <a:endParaRPr lang="ko-KR" altLang="en-US"/>
+          </a:p>
+        </p:txBody>
+      </p:sp>
+    </p:spTree>
+    <p:extLst>
+      <p:ext uri="{BB962C8B-B14F-4D97-AF65-F5344CB8AC3E}">
+        <p14:creationId xmlns:p14="http://schemas.microsoft.com/office/powerpoint/2010/main" val="3228570299"/>
+      </p:ext>
+    </p:extLst>
+  </p:cSld>
+  <p:clrMap bg1="lt1" tx1="dk1" bg2="lt2" tx2="dk2" accent1="accent1" accent2="accent2" accent3="accent3" accent4="accent4" accent5="accent5" accent6="accent6" hlink="hlink" folHlink="folHlink"/>
+  <p:notesStyle>
+    <a:lvl1pPr marL="0" algn="l" defTabSz="914400" rtl="0" eaLnBrk="1" latinLnBrk="1" hangingPunct="1">
+      <a:defRPr sz="1200" kern="1200">
+        <a:solidFill>
+          <a:schemeClr val="tx1"/>
+        </a:solidFill>
+        <a:latin typeface="+mn-lt"/>
+        <a:ea typeface="+mn-ea"/>
+        <a:cs typeface="+mn-cs"/>
+      </a:defRPr>
+    </a:lvl1pPr>
+    <a:lvl2pPr marL="457200" algn="l" defTabSz="914400" rtl="0" eaLnBrk="1" latinLnBrk="1" hangingPunct="1">
+      <a:defRPr sz="1200" kern="1200">
+        <a:solidFill>
+          <a:schemeClr val="tx1"/>
+        </a:solidFill>
+        <a:latin typeface="+mn-lt"/>
+        <a:ea typeface="+mn-ea"/>
+        <a:cs typeface="+mn-cs"/>
+      </a:defRPr>
+    </a:lvl2pPr>
+    <a:lvl3pPr marL="914400" algn="l" defTabSz="914400" rtl="0" eaLnBrk="1" latinLnBrk="1" hangingPunct="1">
+      <a:defRPr sz="1200" kern="1200">
+        <a:solidFill>
+          <a:schemeClr val="tx1"/>
+        </a:solidFill>
+        <a:latin typeface="+mn-lt"/>
+        <a:ea typeface="+mn-ea"/>
+        <a:cs typeface="+mn-cs"/>
+      </a:defRPr>
+    </a:lvl3pPr>
+    <a:lvl4pPr marL="1371600" algn="l" defTabSz="914400" rtl="0" eaLnBrk="1" latinLnBrk="1" hangingPunct="1">
+      <a:defRPr sz="1200" kern="1200">
+        <a:solidFill>
+          <a:schemeClr val="tx1"/>
+        </a:solidFill>
+        <a:latin typeface="+mn-lt"/>
+        <a:ea typeface="+mn-ea"/>
+        <a:cs typeface="+mn-cs"/>
+      </a:defRPr>
+    </a:lvl4pPr>
+    <a:lvl5pPr marL="1828800" algn="l" defTabSz="914400" rtl="0" eaLnBrk="1" latinLnBrk="1" hangingPunct="1">
+      <a:defRPr sz="1200" kern="1200">
+        <a:solidFill>
+          <a:schemeClr val="tx1"/>
+        </a:solidFill>
+        <a:latin typeface="+mn-lt"/>
+        <a:ea typeface="+mn-ea"/>
+        <a:cs typeface="+mn-cs"/>
+      </a:defRPr>
+    </a:lvl5pPr>
+    <a:lvl6pPr marL="2286000" algn="l" defTabSz="914400" rtl="0" eaLnBrk="1" latinLnBrk="1" hangingPunct="1">
+      <a:defRPr sz="1200" kern="1200">
+        <a:solidFill>
+          <a:schemeClr val="tx1"/>
+        </a:solidFill>
+        <a:latin typeface="+mn-lt"/>
+        <a:ea typeface="+mn-ea"/>
+        <a:cs typeface="+mn-cs"/>
+      </a:defRPr>
+    </a:lvl6pPr>
+    <a:lvl7pPr marL="2743200" algn="l" defTabSz="914400" rtl="0" eaLnBrk="1" latinLnBrk="1" hangingPunct="1">
+      <a:defRPr sz="1200" kern="1200">
+        <a:solidFill>
+          <a:schemeClr val="tx1"/>
+        </a:solidFill>
+        <a:latin typeface="+mn-lt"/>
+        <a:ea typeface="+mn-ea"/>
+        <a:cs typeface="+mn-cs"/>
+      </a:defRPr>
+    </a:lvl7pPr>
+    <a:lvl8pPr marL="3200400" algn="l" defTabSz="914400" rtl="0" eaLnBrk="1" latinLnBrk="1" hangingPunct="1">
+      <a:defRPr sz="1200" kern="1200">
+        <a:solidFill>
+          <a:schemeClr val="tx1"/>
+        </a:solidFill>
+        <a:latin typeface="+mn-lt"/>
+        <a:ea typeface="+mn-ea"/>
+        <a:cs typeface="+mn-cs"/>
+      </a:defRPr>
+    </a:lvl8pPr>
+    <a:lvl9pPr marL="3657600" algn="l" defTabSz="914400" rtl="0" eaLnBrk="1" latinLnBrk="1" hangingPunct="1">
+      <a:defRPr sz="1200" kern="1200">
+        <a:solidFill>
+          <a:schemeClr val="tx1"/>
+        </a:solidFill>
+        <a:latin typeface="+mn-lt"/>
+        <a:ea typeface="+mn-ea"/>
+        <a:cs typeface="+mn-cs"/>
+      </a:defRPr>
+    </a:lvl9pPr>
+  </p:notesStyle>
+</p:notesMaster>
+</file>
+
+<file path=ppt/notesSlides/notesSlide1.xml><?xml version="1.0" encoding="utf-8"?>
+<p:notes xmlns:a="http://schemas.openxmlformats.org/drawingml/2006/main" xmlns:r="http://schemas.openxmlformats.org/officeDocument/2006/relationships" xmlns:p="http://schemas.openxmlformats.org/presentationml/2006/main">
+  <p:cSld>
+    <p:spTree>
+      <p:nvGrpSpPr>
+        <p:cNvPr id="1" name=""/>
+        <p:cNvGrpSpPr/>
+        <p:nvPr/>
+      </p:nvGrpSpPr>
+      <p:grpSpPr>
+        <a:xfrm>
+          <a:off x="0" y="0"/>
+          <a:ext cx="0" cy="0"/>
+          <a:chOff x="0" y="0"/>
+          <a:chExt cx="0" cy="0"/>
+        </a:xfrm>
+      </p:grpSpPr>
+      <p:sp>
+        <p:nvSpPr>
+          <p:cNvPr id="2" name="슬라이드 이미지 개체 틀 1"/>
+          <p:cNvSpPr>
+            <a:spLocks noGrp="1" noRot="1" noChangeAspect="1"/>
+          </p:cNvSpPr>
+          <p:nvPr>
+            <p:ph type="sldImg"/>
+          </p:nvPr>
+        </p:nvSpPr>
+        <p:spPr/>
+      </p:sp>
+      <p:sp>
+        <p:nvSpPr>
+          <p:cNvPr id="3" name="슬라이드 노트 개체 틀 2"/>
+          <p:cNvSpPr>
+            <a:spLocks noGrp="1"/>
+          </p:cNvSpPr>
+          <p:nvPr>
+            <p:ph type="body" idx="1"/>
+          </p:nvPr>
+        </p:nvSpPr>
+        <p:spPr/>
+        <p:txBody>
+          <a:bodyPr/>
+          <a:lstStyle/>
+          <a:p>
+            <a:endParaRPr lang="ko-KR" altLang="en-US" dirty="0"/>
+          </a:p>
+        </p:txBody>
+      </p:sp>
+      <p:sp>
+        <p:nvSpPr>
+          <p:cNvPr id="4" name="슬라이드 번호 개체 틀 3"/>
+          <p:cNvSpPr>
+            <a:spLocks noGrp="1"/>
+          </p:cNvSpPr>
+          <p:nvPr>
+            <p:ph type="sldNum" sz="quarter" idx="5"/>
+          </p:nvPr>
+        </p:nvSpPr>
+        <p:spPr/>
+        <p:txBody>
+          <a:bodyPr/>
+          <a:lstStyle/>
+          <a:p>
+            <a:fld id="{2B8858E5-ABDF-43D0-83D1-28899ACC22C6}" type="slidenum">
+              <a:rPr lang="ko-KR" altLang="en-US" smtClean="0"/>
+              <a:t>3</a:t>
+            </a:fld>
+            <a:endParaRPr lang="ko-KR" altLang="en-US"/>
+          </a:p>
+        </p:txBody>
+      </p:sp>
+    </p:spTree>
+    <p:extLst>
+      <p:ext uri="{BB962C8B-B14F-4D97-AF65-F5344CB8AC3E}">
+        <p14:creationId xmlns:p14="http://schemas.microsoft.com/office/powerpoint/2010/main" val="2420303547"/>
+      </p:ext>
+    </p:extLst>
+  </p:cSld>
+  <p:clrMapOvr>
+    <a:masterClrMapping/>
+  </p:clrMapOvr>
+</p:notes>
 </file>
 
 <file path=ppt/slideLayouts/slideLayout1.xml><?xml version="1.0" encoding="utf-8"?>
@@ -12481,9 +12917,10 @@
           </a:p>
           <a:p>
             <a:r>
-              <a:rPr lang="en-US" altLang="ko-KR" dirty="0"/>
-              <a:t>v0.0.2</a:t>
+              <a:rPr lang="en-US" altLang="ko-KR"/>
+              <a:t>v0.2.2</a:t>
             </a:r>
+            <a:endParaRPr lang="en-US" altLang="ko-KR" dirty="0"/>
           </a:p>
           <a:p>
             <a:r>
@@ -12526,6 +12963,60 @@
       </p:grpSpPr>
       <p:sp>
         <p:nvSpPr>
+          <p:cNvPr id="3" name="직사각형 2">
+            <a:extLst>
+              <a:ext uri="{FF2B5EF4-FFF2-40B4-BE49-F238E27FC236}">
+                <a16:creationId xmlns:a16="http://schemas.microsoft.com/office/drawing/2014/main" id="{9910A193-B1CA-2AD6-A3CC-43E7BC350510}"/>
+              </a:ext>
+            </a:extLst>
+          </p:cNvPr>
+          <p:cNvSpPr/>
+          <p:nvPr/>
+        </p:nvSpPr>
+        <p:spPr>
+          <a:xfrm>
+            <a:off x="56562" y="424205"/>
+            <a:ext cx="12078878" cy="6363093"/>
+          </a:xfrm>
+          <a:prstGeom prst="rect">
+            <a:avLst/>
+          </a:prstGeom>
+          <a:solidFill>
+            <a:schemeClr val="bg2"/>
+          </a:solidFill>
+          <a:ln>
+            <a:solidFill>
+              <a:schemeClr val="tx1"/>
+            </a:solidFill>
+          </a:ln>
+        </p:spPr>
+        <p:style>
+          <a:lnRef idx="2">
+            <a:schemeClr val="accent1">
+              <a:shade val="50000"/>
+            </a:schemeClr>
+          </a:lnRef>
+          <a:fillRef idx="1">
+            <a:schemeClr val="accent1"/>
+          </a:fillRef>
+          <a:effectRef idx="0">
+            <a:schemeClr val="accent1"/>
+          </a:effectRef>
+          <a:fontRef idx="minor">
+            <a:schemeClr val="lt1"/>
+          </a:fontRef>
+        </p:style>
+        <p:txBody>
+          <a:bodyPr rtlCol="0" anchor="ctr"/>
+          <a:lstStyle/>
+          <a:p>
+            <a:pPr algn="ctr"/>
+            <a:endParaRPr lang="ko-KR" altLang="en-US"/>
+          </a:p>
+        </p:txBody>
+      </p:sp>
+      <p:sp>
+        <p:nvSpPr>
           <p:cNvPr id="2" name="제목 1">
             <a:extLst>
               <a:ext uri="{FF2B5EF4-FFF2-40B4-BE49-F238E27FC236}">
@@ -12542,16 +13033,18 @@
         </p:nvSpPr>
         <p:spPr>
           <a:xfrm>
-            <a:off x="0" y="0"/>
-            <a:ext cx="4081806" cy="791852"/>
+            <a:off x="1" y="0"/>
+            <a:ext cx="2809188" cy="527901"/>
           </a:xfrm>
         </p:spPr>
         <p:txBody>
-          <a:bodyPr/>
+          <a:bodyPr>
+            <a:normAutofit/>
+          </a:bodyPr>
           <a:lstStyle/>
           <a:p>
             <a:r>
-              <a:rPr lang="ko-KR" altLang="en-US" dirty="0"/>
+              <a:rPr lang="ko-KR" altLang="en-US" sz="3000" dirty="0"/>
               <a:t>전체 개발 순서</a:t>
             </a:r>
           </a:p>
@@ -12617,34 +13110,55 @@
       </p:grpSpPr>
       <p:sp>
         <p:nvSpPr>
-          <p:cNvPr id="2" name="제목 1">
+          <p:cNvPr id="3" name="직사각형 2">
             <a:extLst>
               <a:ext uri="{FF2B5EF4-FFF2-40B4-BE49-F238E27FC236}">
-                <a16:creationId xmlns:a16="http://schemas.microsoft.com/office/drawing/2014/main" id="{82677952-E374-580E-4C7F-F04417DCFAE6}"/>
+                <a16:creationId xmlns:a16="http://schemas.microsoft.com/office/drawing/2014/main" id="{A19D9A20-1893-B240-40F4-12D14FAF2DE6}"/>
               </a:ext>
             </a:extLst>
           </p:cNvPr>
-          <p:cNvSpPr>
-            <a:spLocks noGrp="1"/>
-          </p:cNvSpPr>
-          <p:nvPr>
-            <p:ph type="title"/>
-          </p:nvPr>
+          <p:cNvSpPr/>
+          <p:nvPr/>
         </p:nvSpPr>
         <p:spPr>
           <a:xfrm>
-            <a:off x="0" y="18256"/>
-            <a:ext cx="9916998" cy="1084680"/>
+            <a:off x="56562" y="424205"/>
+            <a:ext cx="12078878" cy="6363093"/>
           </a:xfrm>
+          <a:prstGeom prst="rect">
+            <a:avLst/>
+          </a:prstGeom>
+          <a:solidFill>
+            <a:schemeClr val="bg2"/>
+          </a:solidFill>
+          <a:ln>
+            <a:solidFill>
+              <a:schemeClr val="tx1"/>
+            </a:solidFill>
+          </a:ln>
         </p:spPr>
+        <p:style>
+          <a:lnRef idx="2">
+            <a:schemeClr val="accent1">
+              <a:shade val="50000"/>
+            </a:schemeClr>
+          </a:lnRef>
+          <a:fillRef idx="1">
+            <a:schemeClr val="accent1"/>
+          </a:fillRef>
+          <a:effectRef idx="0">
+            <a:schemeClr val="accent1"/>
+          </a:effectRef>
+          <a:fontRef idx="minor">
+            <a:schemeClr val="lt1"/>
+          </a:fontRef>
+        </p:style>
         <p:txBody>
-          <a:bodyPr/>
+          <a:bodyPr rtlCol="0" anchor="ctr"/>
           <a:lstStyle/>
           <a:p>
-            <a:r>
-              <a:rPr lang="ko-KR" altLang="en-US" dirty="0"/>
-              <a:t>커뮤니티 웹사이트 디자인 개발 순서</a:t>
-            </a:r>
+            <a:pPr algn="ctr"/>
+            <a:endParaRPr lang="ko-KR" altLang="en-US"/>
           </a:p>
         </p:txBody>
       </p:sp>
@@ -12661,18 +13175,18 @@
           <p:nvPr>
             <p:extLst>
               <p:ext uri="{D42A27DB-BD31-4B8C-83A1-F6EECF244321}">
-                <p14:modId xmlns:p14="http://schemas.microsoft.com/office/powerpoint/2010/main" val="1667802577"/>
+                <p14:modId xmlns:p14="http://schemas.microsoft.com/office/powerpoint/2010/main" val="672720088"/>
               </p:ext>
             </p:extLst>
           </p:nvPr>
         </p:nvGraphicFramePr>
         <p:xfrm>
-          <a:off x="2031999" y="389728"/>
+          <a:off x="2031999" y="191765"/>
           <a:ext cx="8884239" cy="5418667"/>
         </p:xfrm>
         <a:graphic>
           <a:graphicData uri="http://schemas.openxmlformats.org/drawingml/2006/diagram">
-            <dgm:relIds xmlns:dgm="http://schemas.openxmlformats.org/drawingml/2006/diagram" xmlns:r="http://schemas.openxmlformats.org/officeDocument/2006/relationships" r:dm="rId2" r:lo="rId3" r:qs="rId4" r:cs="rId5"/>
+            <dgm:relIds xmlns:dgm="http://schemas.openxmlformats.org/drawingml/2006/diagram" xmlns:r="http://schemas.openxmlformats.org/officeDocument/2006/relationships" r:dm="rId3" r:lo="rId4" r:qs="rId5" r:cs="rId6"/>
           </a:graphicData>
         </a:graphic>
       </p:graphicFrame>
@@ -12689,21 +13203,75 @@
           <p:nvPr>
             <p:extLst>
               <p:ext uri="{D42A27DB-BD31-4B8C-83A1-F6EECF244321}">
-                <p14:modId xmlns:p14="http://schemas.microsoft.com/office/powerpoint/2010/main" val="188051641"/>
+                <p14:modId xmlns:p14="http://schemas.microsoft.com/office/powerpoint/2010/main" val="1912348048"/>
               </p:ext>
             </p:extLst>
           </p:nvPr>
         </p:nvGraphicFramePr>
         <p:xfrm>
-          <a:off x="94269" y="4600281"/>
+          <a:off x="94269" y="4402318"/>
           <a:ext cx="11048214" cy="2064470"/>
         </p:xfrm>
         <a:graphic>
           <a:graphicData uri="http://schemas.openxmlformats.org/drawingml/2006/diagram">
-            <dgm:relIds xmlns:dgm="http://schemas.openxmlformats.org/drawingml/2006/diagram" xmlns:r="http://schemas.openxmlformats.org/officeDocument/2006/relationships" r:dm="rId7" r:lo="rId8" r:qs="rId9" r:cs="rId10"/>
+            <dgm:relIds xmlns:dgm="http://schemas.openxmlformats.org/drawingml/2006/diagram" xmlns:r="http://schemas.openxmlformats.org/officeDocument/2006/relationships" r:dm="rId8" r:lo="rId9" r:qs="rId10" r:cs="rId11"/>
           </a:graphicData>
         </a:graphic>
       </p:graphicFrame>
+      <p:sp>
+        <p:nvSpPr>
+          <p:cNvPr id="8" name="제목 1">
+            <a:extLst>
+              <a:ext uri="{FF2B5EF4-FFF2-40B4-BE49-F238E27FC236}">
+                <a16:creationId xmlns:a16="http://schemas.microsoft.com/office/drawing/2014/main" id="{6364BDF6-38C3-64A9-E6E0-773DE016BBB1}"/>
+              </a:ext>
+            </a:extLst>
+          </p:cNvPr>
+          <p:cNvSpPr txBox="1">
+            <a:spLocks/>
+          </p:cNvSpPr>
+          <p:nvPr/>
+        </p:nvSpPr>
+        <p:spPr>
+          <a:xfrm>
+            <a:off x="1" y="0"/>
+            <a:ext cx="6523348" cy="527901"/>
+          </a:xfrm>
+          <a:prstGeom prst="rect">
+            <a:avLst/>
+          </a:prstGeom>
+        </p:spPr>
+        <p:txBody>
+          <a:bodyPr vert="horz" lIns="91440" tIns="45720" rIns="91440" bIns="45720" rtlCol="0" anchor="ctr">
+            <a:normAutofit/>
+          </a:bodyPr>
+          <a:lstStyle>
+            <a:lvl1pPr algn="l" defTabSz="914400" rtl="0" eaLnBrk="1" latinLnBrk="1" hangingPunct="1">
+              <a:lnSpc>
+                <a:spcPct val="90000"/>
+              </a:lnSpc>
+              <a:spcBef>
+                <a:spcPct val="0"/>
+              </a:spcBef>
+              <a:buNone/>
+              <a:defRPr sz="4400" kern="1200">
+                <a:solidFill>
+                  <a:schemeClr val="tx1"/>
+                </a:solidFill>
+                <a:latin typeface="+mj-lt"/>
+                <a:ea typeface="+mj-ea"/>
+                <a:cs typeface="+mj-cs"/>
+              </a:defRPr>
+            </a:lvl1pPr>
+          </a:lstStyle>
+          <a:p>
+            <a:r>
+              <a:rPr lang="ko-KR" altLang="en-US" sz="3000" dirty="0"/>
+              <a:t>커뮤니티 웹사이트 디자인 확장 순서</a:t>
+            </a:r>
+          </a:p>
+        </p:txBody>
+      </p:sp>
     </p:spTree>
     <p:extLst>
       <p:ext uri="{BB962C8B-B14F-4D97-AF65-F5344CB8AC3E}">
@@ -12734,6 +13302,60 @@
           <a:chExt cx="0" cy="0"/>
         </a:xfrm>
       </p:grpSpPr>
+      <p:sp>
+        <p:nvSpPr>
+          <p:cNvPr id="3" name="직사각형 2">
+            <a:extLst>
+              <a:ext uri="{FF2B5EF4-FFF2-40B4-BE49-F238E27FC236}">
+                <a16:creationId xmlns:a16="http://schemas.microsoft.com/office/drawing/2014/main" id="{3D4DD5BF-F61C-3C78-C2D4-AD3397AC0322}"/>
+              </a:ext>
+            </a:extLst>
+          </p:cNvPr>
+          <p:cNvSpPr/>
+          <p:nvPr/>
+        </p:nvSpPr>
+        <p:spPr>
+          <a:xfrm>
+            <a:off x="56562" y="424205"/>
+            <a:ext cx="12078878" cy="6363093"/>
+          </a:xfrm>
+          <a:prstGeom prst="rect">
+            <a:avLst/>
+          </a:prstGeom>
+          <a:solidFill>
+            <a:schemeClr val="bg2"/>
+          </a:solidFill>
+          <a:ln>
+            <a:solidFill>
+              <a:schemeClr val="tx1"/>
+            </a:solidFill>
+          </a:ln>
+        </p:spPr>
+        <p:style>
+          <a:lnRef idx="2">
+            <a:schemeClr val="accent1">
+              <a:shade val="50000"/>
+            </a:schemeClr>
+          </a:lnRef>
+          <a:fillRef idx="1">
+            <a:schemeClr val="accent1"/>
+          </a:fillRef>
+          <a:effectRef idx="0">
+            <a:schemeClr val="accent1"/>
+          </a:effectRef>
+          <a:fontRef idx="minor">
+            <a:schemeClr val="lt1"/>
+          </a:fontRef>
+        </p:style>
+        <p:txBody>
+          <a:bodyPr rtlCol="0" anchor="ctr"/>
+          <a:lstStyle/>
+          <a:p>
+            <a:pPr algn="ctr"/>
+            <a:endParaRPr lang="ko-KR" altLang="en-US"/>
+          </a:p>
+        </p:txBody>
+      </p:sp>
       <p:grpSp>
         <p:nvGrpSpPr>
           <p:cNvPr id="45" name="그룹 44">
@@ -12748,7 +13370,7 @@
         </p:nvGrpSpPr>
         <p:grpSpPr>
           <a:xfrm>
-            <a:off x="113122" y="116275"/>
+            <a:off x="113122" y="584462"/>
             <a:ext cx="876693" cy="4240291"/>
             <a:chOff x="103694" y="0"/>
             <a:chExt cx="876693" cy="4240291"/>
@@ -13200,7 +13822,7 @@
         </p:nvGrpSpPr>
         <p:grpSpPr>
           <a:xfrm>
-            <a:off x="11051355" y="116275"/>
+            <a:off x="11051355" y="584462"/>
             <a:ext cx="1027523" cy="5629258"/>
             <a:chOff x="11051355" y="116275"/>
             <a:chExt cx="1027523" cy="5629258"/>
@@ -13909,6 +14531,58 @@
           </p:sp>
         </p:grpSp>
       </p:grpSp>
+      <p:sp>
+        <p:nvSpPr>
+          <p:cNvPr id="2" name="제목 1">
+            <a:extLst>
+              <a:ext uri="{FF2B5EF4-FFF2-40B4-BE49-F238E27FC236}">
+                <a16:creationId xmlns:a16="http://schemas.microsoft.com/office/drawing/2014/main" id="{6B1CCBDB-D290-437D-990A-552AC4A1EB6F}"/>
+              </a:ext>
+            </a:extLst>
+          </p:cNvPr>
+          <p:cNvSpPr txBox="1">
+            <a:spLocks/>
+          </p:cNvSpPr>
+          <p:nvPr/>
+        </p:nvSpPr>
+        <p:spPr>
+          <a:xfrm>
+            <a:off x="-1" y="0"/>
+            <a:ext cx="6202838" cy="584462"/>
+          </a:xfrm>
+          <a:prstGeom prst="rect">
+            <a:avLst/>
+          </a:prstGeom>
+        </p:spPr>
+        <p:txBody>
+          <a:bodyPr/>
+          <a:lstStyle>
+            <a:lvl1pPr algn="l" defTabSz="914400" rtl="0" eaLnBrk="1" latinLnBrk="1" hangingPunct="1">
+              <a:lnSpc>
+                <a:spcPct val="90000"/>
+              </a:lnSpc>
+              <a:spcBef>
+                <a:spcPct val="0"/>
+              </a:spcBef>
+              <a:buNone/>
+              <a:defRPr sz="4400" kern="1200">
+                <a:solidFill>
+                  <a:schemeClr val="tx1"/>
+                </a:solidFill>
+                <a:latin typeface="+mj-lt"/>
+                <a:ea typeface="+mj-ea"/>
+                <a:cs typeface="+mj-cs"/>
+              </a:defRPr>
+            </a:lvl1pPr>
+          </a:lstStyle>
+          <a:p>
+            <a:r>
+              <a:rPr lang="ko-KR" altLang="en-US" sz="3000" dirty="0"/>
+              <a:t>커뮤니티 웹사이트 시스템 구성도</a:t>
+            </a:r>
+          </a:p>
+        </p:txBody>
+      </p:sp>
     </p:spTree>
     <p:extLst>
       <p:ext uri="{BB962C8B-B14F-4D97-AF65-F5344CB8AC3E}">
@@ -14215,4 +14889,299 @@
     </a:ext>
   </a:extLst>
 </a:theme>
+</file>
+
+<file path=ppt/theme/theme2.xml><?xml version="1.0" encoding="utf-8"?>
+<a:theme xmlns:a="http://schemas.openxmlformats.org/drawingml/2006/main" name="Office 테마">
+  <a:themeElements>
+    <a:clrScheme name="Office">
+      <a:dk1>
+        <a:sysClr val="windowText" lastClr="000000"/>
+      </a:dk1>
+      <a:lt1>
+        <a:sysClr val="window" lastClr="FFFFFF"/>
+      </a:lt1>
+      <a:dk2>
+        <a:srgbClr val="44546A"/>
+      </a:dk2>
+      <a:lt2>
+        <a:srgbClr val="E7E6E6"/>
+      </a:lt2>
+      <a:accent1>
+        <a:srgbClr val="4472C4"/>
+      </a:accent1>
+      <a:accent2>
+        <a:srgbClr val="ED7D31"/>
+      </a:accent2>
+      <a:accent3>
+        <a:srgbClr val="A5A5A5"/>
+      </a:accent3>
+      <a:accent4>
+        <a:srgbClr val="FFC000"/>
+      </a:accent4>
+      <a:accent5>
+        <a:srgbClr val="5B9BD5"/>
+      </a:accent5>
+      <a:accent6>
+        <a:srgbClr val="70AD47"/>
+      </a:accent6>
+      <a:hlink>
+        <a:srgbClr val="0563C1"/>
+      </a:hlink>
+      <a:folHlink>
+        <a:srgbClr val="954F72"/>
+      </a:folHlink>
+    </a:clrScheme>
+    <a:fontScheme name="Office">
+      <a:majorFont>
+        <a:latin typeface="맑은 고딕" panose="020F0302020204030204"/>
+        <a:ea typeface=""/>
+        <a:cs typeface=""/>
+        <a:font script="Jpan" typeface="游ゴシック Light"/>
+        <a:font script="Hang" typeface="맑은 고딕"/>
+        <a:font script="Hans" typeface="等线 Light"/>
+        <a:font script="Hant" typeface="新細明體"/>
+        <a:font script="Arab" typeface="Times New Roman"/>
+        <a:font script="Hebr" typeface="Times New Roman"/>
+        <a:font script="Thai" typeface="Angsana New"/>
+        <a:font script="Ethi" typeface="Nyala"/>
+        <a:font script="Beng" typeface="Vrinda"/>
+        <a:font script="Gujr" typeface="Shruti"/>
+        <a:font script="Khmr" typeface="MoolBoran"/>
+        <a:font script="Knda" typeface="Tunga"/>
+        <a:font script="Guru" typeface="Raavi"/>
+        <a:font script="Cans" typeface="Euphemia"/>
+        <a:font script="Cher" typeface="Plantagenet Cherokee"/>
+        <a:font script="Yiii" typeface="Microsoft Yi Baiti"/>
+        <a:font script="Tibt" typeface="Microsoft Himalaya"/>
+        <a:font script="Thaa" typeface="MV Boli"/>
+        <a:font script="Deva" typeface="Mangal"/>
+        <a:font script="Telu" typeface="Gautami"/>
+        <a:font script="Taml" typeface="Latha"/>
+        <a:font script="Syrc" typeface="Estrangelo Edessa"/>
+        <a:font script="Orya" typeface="Kalinga"/>
+        <a:font script="Mlym" typeface="Kartika"/>
+        <a:font script="Laoo" typeface="DokChampa"/>
+        <a:font script="Sinh" typeface="Iskoola Pota"/>
+        <a:font script="Mong" typeface="Mongolian Baiti"/>
+        <a:font script="Viet" typeface="Times New Roman"/>
+        <a:font script="Uigh" typeface="Microsoft Uighur"/>
+        <a:font script="Geor" typeface="Sylfaen"/>
+        <a:font script="Armn" typeface="Arial"/>
+        <a:font script="Bugi" typeface="Leelawadee UI"/>
+        <a:font script="Bopo" typeface="Microsoft JhengHei"/>
+        <a:font script="Java" typeface="Javanese Text"/>
+        <a:font script="Lisu" typeface="Segoe UI"/>
+        <a:font script="Mymr" typeface="Myanmar Text"/>
+        <a:font script="Nkoo" typeface="Ebrima"/>
+        <a:font script="Olck" typeface="Nirmala UI"/>
+        <a:font script="Osma" typeface="Ebrima"/>
+        <a:font script="Phag" typeface="Phagspa"/>
+        <a:font script="Syrn" typeface="Estrangelo Edessa"/>
+        <a:font script="Syrj" typeface="Estrangelo Edessa"/>
+        <a:font script="Syre" typeface="Estrangelo Edessa"/>
+        <a:font script="Sora" typeface="Nirmala UI"/>
+        <a:font script="Tale" typeface="Microsoft Tai Le"/>
+        <a:font script="Talu" typeface="Microsoft New Tai Lue"/>
+        <a:font script="Tfng" typeface="Ebrima"/>
+      </a:majorFont>
+      <a:minorFont>
+        <a:latin typeface="맑은 고딕" panose="020F0502020204030204"/>
+        <a:ea typeface=""/>
+        <a:cs typeface=""/>
+        <a:font script="Jpan" typeface="游ゴシック"/>
+        <a:font script="Hang" typeface="맑은 고딕"/>
+        <a:font script="Hans" typeface="等线"/>
+        <a:font script="Hant" typeface="新細明體"/>
+        <a:font script="Arab" typeface="Arial"/>
+        <a:font script="Hebr" typeface="Arial"/>
+        <a:font script="Thai" typeface="Cordia New"/>
+        <a:font script="Ethi" typeface="Nyala"/>
+        <a:font script="Beng" typeface="Vrinda"/>
+        <a:font script="Gujr" typeface="Shruti"/>
+        <a:font script="Khmr" typeface="DaunPenh"/>
+        <a:font script="Knda" typeface="Tunga"/>
+        <a:font script="Guru" typeface="Raavi"/>
+        <a:font script="Cans" typeface="Euphemia"/>
+        <a:font script="Cher" typeface="Plantagenet Cherokee"/>
+        <a:font script="Yiii" typeface="Microsoft Yi Baiti"/>
+        <a:font script="Tibt" typeface="Microsoft Himalaya"/>
+        <a:font script="Thaa" typeface="MV Boli"/>
+        <a:font script="Deva" typeface="Mangal"/>
+        <a:font script="Telu" typeface="Gautami"/>
+        <a:font script="Taml" typeface="Latha"/>
+        <a:font script="Syrc" typeface="Estrangelo Edessa"/>
+        <a:font script="Orya" typeface="Kalinga"/>
+        <a:font script="Mlym" typeface="Kartika"/>
+        <a:font script="Laoo" typeface="DokChampa"/>
+        <a:font script="Sinh" typeface="Iskoola Pota"/>
+        <a:font script="Mong" typeface="Mongolian Baiti"/>
+        <a:font script="Viet" typeface="Arial"/>
+        <a:font script="Uigh" typeface="Microsoft Uighur"/>
+        <a:font script="Geor" typeface="Sylfaen"/>
+        <a:font script="Armn" typeface="Arial"/>
+        <a:font script="Bugi" typeface="Leelawadee UI"/>
+        <a:font script="Bopo" typeface="Microsoft JhengHei"/>
+        <a:font script="Java" typeface="Javanese Text"/>
+        <a:font script="Lisu" typeface="Segoe UI"/>
+        <a:font script="Mymr" typeface="Myanmar Text"/>
+        <a:font script="Nkoo" typeface="Ebrima"/>
+        <a:font script="Olck" typeface="Nirmala UI"/>
+        <a:font script="Osma" typeface="Ebrima"/>
+        <a:font script="Phag" typeface="Phagspa"/>
+        <a:font script="Syrn" typeface="Estrangelo Edessa"/>
+        <a:font script="Syrj" typeface="Estrangelo Edessa"/>
+        <a:font script="Syre" typeface="Estrangelo Edessa"/>
+        <a:font script="Sora" typeface="Nirmala UI"/>
+        <a:font script="Tale" typeface="Microsoft Tai Le"/>
+        <a:font script="Talu" typeface="Microsoft New Tai Lue"/>
+        <a:font script="Tfng" typeface="Ebrima"/>
+      </a:minorFont>
+    </a:fontScheme>
+    <a:fmtScheme name="Office">
+      <a:fillStyleLst>
+        <a:solidFill>
+          <a:schemeClr val="phClr"/>
+        </a:solidFill>
+        <a:gradFill rotWithShape="1">
+          <a:gsLst>
+            <a:gs pos="0">
+              <a:schemeClr val="phClr">
+                <a:lumMod val="110000"/>
+                <a:satMod val="105000"/>
+                <a:tint val="67000"/>
+              </a:schemeClr>
+            </a:gs>
+            <a:gs pos="50000">
+              <a:schemeClr val="phClr">
+                <a:lumMod val="105000"/>
+                <a:satMod val="103000"/>
+                <a:tint val="73000"/>
+              </a:schemeClr>
+            </a:gs>
+            <a:gs pos="100000">
+              <a:schemeClr val="phClr">
+                <a:lumMod val="105000"/>
+                <a:satMod val="109000"/>
+                <a:tint val="81000"/>
+              </a:schemeClr>
+            </a:gs>
+          </a:gsLst>
+          <a:lin ang="5400000" scaled="0"/>
+        </a:gradFill>
+        <a:gradFill rotWithShape="1">
+          <a:gsLst>
+            <a:gs pos="0">
+              <a:schemeClr val="phClr">
+                <a:satMod val="103000"/>
+                <a:lumMod val="102000"/>
+                <a:tint val="94000"/>
+              </a:schemeClr>
+            </a:gs>
+            <a:gs pos="50000">
+              <a:schemeClr val="phClr">
+                <a:satMod val="110000"/>
+                <a:lumMod val="100000"/>
+                <a:shade val="100000"/>
+              </a:schemeClr>
+            </a:gs>
+            <a:gs pos="100000">
+              <a:schemeClr val="phClr">
+                <a:lumMod val="99000"/>
+                <a:satMod val="120000"/>
+                <a:shade val="78000"/>
+              </a:schemeClr>
+            </a:gs>
+          </a:gsLst>
+          <a:lin ang="5400000" scaled="0"/>
+        </a:gradFill>
+      </a:fillStyleLst>
+      <a:lnStyleLst>
+        <a:ln w="6350" cap="flat" cmpd="sng" algn="ctr">
+          <a:solidFill>
+            <a:schemeClr val="phClr"/>
+          </a:solidFill>
+          <a:prstDash val="solid"/>
+          <a:miter lim="800000"/>
+        </a:ln>
+        <a:ln w="12700" cap="flat" cmpd="sng" algn="ctr">
+          <a:solidFill>
+            <a:schemeClr val="phClr"/>
+          </a:solidFill>
+          <a:prstDash val="solid"/>
+          <a:miter lim="800000"/>
+        </a:ln>
+        <a:ln w="19050" cap="flat" cmpd="sng" algn="ctr">
+          <a:solidFill>
+            <a:schemeClr val="phClr"/>
+          </a:solidFill>
+          <a:prstDash val="solid"/>
+          <a:miter lim="800000"/>
+        </a:ln>
+      </a:lnStyleLst>
+      <a:effectStyleLst>
+        <a:effectStyle>
+          <a:effectLst/>
+        </a:effectStyle>
+        <a:effectStyle>
+          <a:effectLst/>
+        </a:effectStyle>
+        <a:effectStyle>
+          <a:effectLst>
+            <a:outerShdw blurRad="57150" dist="19050" dir="5400000" algn="ctr" rotWithShape="0">
+              <a:srgbClr val="000000">
+                <a:alpha val="63000"/>
+              </a:srgbClr>
+            </a:outerShdw>
+          </a:effectLst>
+        </a:effectStyle>
+      </a:effectStyleLst>
+      <a:bgFillStyleLst>
+        <a:solidFill>
+          <a:schemeClr val="phClr"/>
+        </a:solidFill>
+        <a:solidFill>
+          <a:schemeClr val="phClr">
+            <a:tint val="95000"/>
+            <a:satMod val="170000"/>
+          </a:schemeClr>
+        </a:solidFill>
+        <a:gradFill rotWithShape="1">
+          <a:gsLst>
+            <a:gs pos="0">
+              <a:schemeClr val="phClr">
+                <a:tint val="93000"/>
+                <a:satMod val="150000"/>
+                <a:shade val="98000"/>
+                <a:lumMod val="102000"/>
+              </a:schemeClr>
+            </a:gs>
+            <a:gs pos="50000">
+              <a:schemeClr val="phClr">
+                <a:tint val="98000"/>
+                <a:satMod val="130000"/>
+                <a:shade val="90000"/>
+                <a:lumMod val="103000"/>
+              </a:schemeClr>
+            </a:gs>
+            <a:gs pos="100000">
+              <a:schemeClr val="phClr">
+                <a:shade val="63000"/>
+                <a:satMod val="120000"/>
+              </a:schemeClr>
+            </a:gs>
+          </a:gsLst>
+          <a:lin ang="5400000" scaled="0"/>
+        </a:gradFill>
+      </a:bgFillStyleLst>
+    </a:fmtScheme>
+  </a:themeElements>
+  <a:objectDefaults/>
+  <a:extraClrSchemeLst/>
+  <a:extLst>
+    <a:ext uri="{05A4C25C-085E-4340-85A3-A5531E510DB2}">
+      <thm15:themeFamily xmlns:thm15="http://schemas.microsoft.com/office/thememl/2012/main" name="Office Theme 2013 - 2022" id="{62F939B6-93AF-4DB8-9C6B-D6C7DFDC589F}" vid="{4A3C46E8-61CC-4603-A589-7422A47A8E4A}"/>
+    </a:ext>
+  </a:extLst>
+</a:theme>
 </file>
</xml_diff>